<commit_message>
add PDF of slides
</commit_message>
<xml_diff>
--- a/Data_Techniques.pptx
+++ b/Data_Techniques.pptx
@@ -6928,8 +6928,13 @@
           <a:p>
             <a:r>
               <a:rPr lang="en-US" dirty="0"/>
-              <a:t>Work a case study of analyzing an experiment</a:t>
-            </a:r>
+              <a:t>Work a case study of analyzing an experiment – TBD based on </a:t>
+            </a:r>
+            <a:r>
+              <a:rPr lang="en-US"/>
+              <a:t>Will input</a:t>
+            </a:r>
+            <a:endParaRPr lang="en-US" dirty="0"/>
           </a:p>
           <a:p>
             <a:endParaRPr lang="en-US" dirty="0"/>

</xml_diff>

<commit_message>
Updates to architecture diagram
</commit_message>
<xml_diff>
--- a/Data_Techniques.pptx
+++ b/Data_Techniques.pptx
@@ -6429,10 +6429,10 @@
       </p:sp>
       <p:pic>
         <p:nvPicPr>
-          <p:cNvPr id="5" name="Content Placeholder 4" descr="A diagram of a data flow&#10;&#10;Description automatically generated">
+          <p:cNvPr id="7" name="Content Placeholder 6" descr="A diagram of a data flow&#10;&#10;Description automatically generated">
             <a:extLst>
               <a:ext uri="{FF2B5EF4-FFF2-40B4-BE49-F238E27FC236}">
-                <a16:creationId xmlns:a16="http://schemas.microsoft.com/office/drawing/2014/main" id="{5B3B458D-7DB6-7A4F-DE36-FE8B36B69AFB}"/>
+                <a16:creationId xmlns:a16="http://schemas.microsoft.com/office/drawing/2014/main" id="{41AB4AA5-159D-85D1-DE63-FC3E07F8E077}"/>
               </a:ext>
             </a:extLst>
           </p:cNvPr>
@@ -6457,8 +6457,8 @@
         </p:blipFill>
         <p:spPr>
           <a:xfrm>
-            <a:off x="1307591" y="1855477"/>
-            <a:ext cx="9431727" cy="4536179"/>
+            <a:off x="1323190" y="1782037"/>
+            <a:ext cx="10194581" cy="5075963"/>
           </a:xfrm>
         </p:spPr>
       </p:pic>
@@ -6928,13 +6928,8 @@
           <a:p>
             <a:r>
               <a:rPr lang="en-US" dirty="0"/>
-              <a:t>Work a case study of analyzing an experiment – TBD based on </a:t>
-            </a:r>
-            <a:r>
-              <a:rPr lang="en-US"/>
-              <a:t>Will input</a:t>
-            </a:r>
-            <a:endParaRPr lang="en-US" dirty="0"/>
+              <a:t>Work a case study of analyzing an experiment – TBD based on Will input</a:t>
+            </a:r>
           </a:p>
           <a:p>
             <a:endParaRPr lang="en-US" dirty="0"/>

</xml_diff>

<commit_message>
Add regex string parsing example
</commit_message>
<xml_diff>
--- a/Data_Techniques.pptx
+++ b/Data_Techniques.pptx
@@ -11,12 +11,13 @@
     <p:sldId id="264" r:id="rId5"/>
     <p:sldId id="265" r:id="rId6"/>
     <p:sldId id="266" r:id="rId7"/>
-    <p:sldId id="267" r:id="rId8"/>
-    <p:sldId id="257" r:id="rId9"/>
-    <p:sldId id="259" r:id="rId10"/>
-    <p:sldId id="260" r:id="rId11"/>
-    <p:sldId id="261" r:id="rId12"/>
-    <p:sldId id="258" r:id="rId13"/>
+    <p:sldId id="268" r:id="rId8"/>
+    <p:sldId id="267" r:id="rId9"/>
+    <p:sldId id="257" r:id="rId10"/>
+    <p:sldId id="259" r:id="rId11"/>
+    <p:sldId id="260" r:id="rId12"/>
+    <p:sldId id="261" r:id="rId13"/>
+    <p:sldId id="258" r:id="rId14"/>
   </p:sldIdLst>
   <p:sldSz cx="12192000" cy="6858000"/>
   <p:notesSz cx="6858000" cy="9144000"/>
@@ -2077,7 +2078,7 @@
           <a:p>
             <a:fld id="{ED291B17-9318-49DB-B28B-6E5994AE9581}" type="datetime1">
               <a:rPr lang="en-US" smtClean="0"/>
-              <a:t>10/9/23</a:t>
+              <a:t>10/10/23</a:t>
             </a:fld>
             <a:endParaRPr lang="en-US" dirty="0"/>
           </a:p>
@@ -2280,7 +2281,7 @@
           <a:p>
             <a:fld id="{2CED4963-E985-44C4-B8C4-FDD613B7C2F8}" type="datetime1">
               <a:rPr lang="en-US" smtClean="0"/>
-              <a:t>10/9/23</a:t>
+              <a:t>10/10/23</a:t>
             </a:fld>
             <a:endParaRPr lang="en-US" dirty="0"/>
           </a:p>
@@ -2642,7 +2643,7 @@
           <a:p>
             <a:fld id="{ED291B17-9318-49DB-B28B-6E5994AE9581}" type="datetime1">
               <a:rPr lang="en-US" smtClean="0"/>
-              <a:t>10/9/23</a:t>
+              <a:t>10/10/23</a:t>
             </a:fld>
             <a:endParaRPr lang="en-US" dirty="0"/>
           </a:p>
@@ -2840,7 +2841,7 @@
           <a:p>
             <a:fld id="{78DD82B9-B8EE-4375-B6FF-88FA6ABB15D9}" type="datetime1">
               <a:rPr lang="en-US" smtClean="0"/>
-              <a:t>10/9/23</a:t>
+              <a:t>10/10/23</a:t>
             </a:fld>
             <a:endParaRPr lang="en-US" dirty="0"/>
           </a:p>
@@ -3152,7 +3153,7 @@
           <a:p>
             <a:fld id="{B2497495-0637-405E-AE64-5CC7506D51F5}" type="datetime1">
               <a:rPr lang="en-US" smtClean="0"/>
-              <a:t>10/9/23</a:t>
+              <a:t>10/10/23</a:t>
             </a:fld>
             <a:endParaRPr lang="en-US" dirty="0"/>
           </a:p>
@@ -3405,7 +3406,7 @@
           <a:p>
             <a:fld id="{7BFFD690-9426-415D-8B65-26881E07B2D4}" type="datetime1">
               <a:rPr lang="en-US" smtClean="0"/>
-              <a:t>10/9/23</a:t>
+              <a:t>10/10/23</a:t>
             </a:fld>
             <a:endParaRPr lang="en-US" dirty="0"/>
           </a:p>
@@ -3835,7 +3836,7 @@
           <a:p>
             <a:fld id="{04C4989A-474C-40DE-95B9-011C28B71673}" type="datetime1">
               <a:rPr lang="en-US" smtClean="0"/>
-              <a:t>10/9/23</a:t>
+              <a:t>10/10/23</a:t>
             </a:fld>
             <a:endParaRPr lang="en-US" dirty="0"/>
           </a:p>
@@ -3958,7 +3959,7 @@
           <a:p>
             <a:fld id="{5DB4ED54-5B5E-4A04-93D3-5772E3CE3818}" type="datetime1">
               <a:rPr lang="en-US" smtClean="0"/>
-              <a:t>10/9/23</a:t>
+              <a:t>10/10/23</a:t>
             </a:fld>
             <a:endParaRPr lang="en-US" dirty="0"/>
           </a:p>
@@ -4053,7 +4054,7 @@
           <a:p>
             <a:fld id="{4EDE50D6-574B-40AF-946F-D52A04ADE379}" type="datetime1">
               <a:rPr lang="en-US" smtClean="0"/>
-              <a:t>10/9/23</a:t>
+              <a:t>10/10/23</a:t>
             </a:fld>
             <a:endParaRPr lang="en-US" dirty="0"/>
           </a:p>
@@ -4430,7 +4431,7 @@
           <a:p>
             <a:fld id="{D82884F1-FFEA-405F-9602-3DCA865EDA4E}" type="datetime1">
               <a:rPr lang="en-US" smtClean="0"/>
-              <a:t>10/9/23</a:t>
+              <a:t>10/10/23</a:t>
             </a:fld>
             <a:endParaRPr lang="en-US" dirty="0"/>
           </a:p>
@@ -4726,7 +4727,7 @@
           <a:p>
             <a:fld id="{7E18DB4A-8810-4A10-AD5C-D5E2C667F5B3}" type="datetime1">
               <a:rPr lang="en-US" smtClean="0"/>
-              <a:t>10/9/23</a:t>
+              <a:t>10/10/23</a:t>
             </a:fld>
             <a:endParaRPr lang="en-US" dirty="0"/>
           </a:p>
@@ -4941,7 +4942,7 @@
           <a:p>
             <a:fld id="{ED291B17-9318-49DB-B28B-6E5994AE9581}" type="datetime1">
               <a:rPr lang="en-US" smtClean="0"/>
-              <a:t>10/9/23</a:t>
+              <a:t>10/10/23</a:t>
             </a:fld>
             <a:endParaRPr lang="en-US" dirty="0"/>
           </a:p>
@@ -5965,10 +5966,10 @@
       </p:grpSpPr>
       <p:sp useBgFill="1">
         <p:nvSpPr>
-          <p:cNvPr id="24" name="Rectangle 23">
+          <p:cNvPr id="10" name="Rectangle 9">
             <a:extLst>
               <a:ext uri="{FF2B5EF4-FFF2-40B4-BE49-F238E27FC236}">
-                <a16:creationId xmlns:a16="http://schemas.microsoft.com/office/drawing/2014/main" id="{504BED40-EAF7-4E55-AFF7-2CD840EBD3AA}"/>
+                <a16:creationId xmlns:a16="http://schemas.microsoft.com/office/drawing/2014/main" id="{F875149D-F692-45DA-8324-D5E0193D5FC4}"/>
               </a:ext>
               <a:ext uri="{C183D7F6-B498-43B3-948B-1728B52AA6E4}">
                 <adec:decorative xmlns:adec="http://schemas.microsoft.com/office/drawing/2017/decorative" val="1"/>
@@ -5989,7 +5990,7 @@
         <p:spPr>
           <a:xfrm>
             <a:off x="0" y="0"/>
-            <a:ext cx="12192000" cy="6858000"/>
+            <a:ext cx="12191999" cy="6858001"/>
           </a:xfrm>
           <a:prstGeom prst="rect">
             <a:avLst/>
@@ -6025,49 +6026,10 @@
       </p:sp>
       <p:sp>
         <p:nvSpPr>
-          <p:cNvPr id="2" name="Title 1">
+          <p:cNvPr id="12" name="Rectangle 11">
             <a:extLst>
               <a:ext uri="{FF2B5EF4-FFF2-40B4-BE49-F238E27FC236}">
-                <a16:creationId xmlns:a16="http://schemas.microsoft.com/office/drawing/2014/main" id="{54EE378A-F88D-4129-A984-BE9F8C7B2BC5}"/>
-              </a:ext>
-            </a:extLst>
-          </p:cNvPr>
-          <p:cNvSpPr>
-            <a:spLocks noGrp="1"/>
-          </p:cNvSpPr>
-          <p:nvPr>
-            <p:ph type="title"/>
-          </p:nvPr>
-        </p:nvSpPr>
-        <p:spPr>
-          <a:xfrm>
-            <a:off x="581193" y="702156"/>
-            <a:ext cx="6309003" cy="1013800"/>
-          </a:xfrm>
-        </p:spPr>
-        <p:txBody>
-          <a:bodyPr>
-            <a:normAutofit/>
-          </a:bodyPr>
-          <a:lstStyle/>
-          <a:p>
-            <a:r>
-              <a:rPr lang="en-US">
-                <a:solidFill>
-                  <a:schemeClr val="tx2"/>
-                </a:solidFill>
-              </a:rPr>
-              <a:t>What Do these have in common?</a:t>
-            </a:r>
-          </a:p>
-        </p:txBody>
-      </p:sp>
-      <p:sp>
-        <p:nvSpPr>
-          <p:cNvPr id="26" name="Rectangle 25">
-            <a:extLst>
-              <a:ext uri="{FF2B5EF4-FFF2-40B4-BE49-F238E27FC236}">
-                <a16:creationId xmlns:a16="http://schemas.microsoft.com/office/drawing/2014/main" id="{F367CCF1-BB1E-41CF-8499-94A870C33EFA}"/>
+                <a16:creationId xmlns:a16="http://schemas.microsoft.com/office/drawing/2014/main" id="{C0B19935-C760-4698-9DD1-973C8A428D26}"/>
               </a:ext>
               <a:ext uri="{C183D7F6-B498-43B3-948B-1728B52AA6E4}">
                 <adec:decorative xmlns:adec="http://schemas.microsoft.com/office/drawing/2017/decorative" val="1"/>
@@ -6088,13 +6050,13 @@
         <p:spPr>
           <a:xfrm>
             <a:off x="446534" y="457200"/>
-            <a:ext cx="6675120" cy="94997"/>
+            <a:ext cx="3703320" cy="94997"/>
           </a:xfrm>
           <a:prstGeom prst="rect">
             <a:avLst/>
           </a:prstGeom>
           <a:solidFill>
-            <a:schemeClr val="accent1"/>
+            <a:srgbClr val="465359"/>
           </a:solidFill>
           <a:ln>
             <a:noFill/>
@@ -6125,240 +6087,415 @@
       </p:sp>
       <p:sp>
         <p:nvSpPr>
-          <p:cNvPr id="3" name="Content Placeholder 2">
+          <p:cNvPr id="14" name="Rectangle 13">
             <a:extLst>
               <a:ext uri="{FF2B5EF4-FFF2-40B4-BE49-F238E27FC236}">
-                <a16:creationId xmlns:a16="http://schemas.microsoft.com/office/drawing/2014/main" id="{F6CC5DE2-2678-4F40-A49A-D84BF4E75F4F}"/>
+                <a16:creationId xmlns:a16="http://schemas.microsoft.com/office/drawing/2014/main" id="{08990612-E008-4F02-AEBB-B140BE753558}"/>
+              </a:ext>
+              <a:ext uri="{C183D7F6-B498-43B3-948B-1728B52AA6E4}">
+                <adec:decorative xmlns:adec="http://schemas.microsoft.com/office/drawing/2017/decorative" val="1"/>
               </a:ext>
             </a:extLst>
           </p:cNvPr>
           <p:cNvSpPr>
-            <a:spLocks noGrp="1"/>
-          </p:cNvSpPr>
-          <p:nvPr>
-            <p:ph idx="1"/>
-          </p:nvPr>
-        </p:nvSpPr>
-        <p:spPr>
-          <a:xfrm>
-            <a:off x="581194" y="1896533"/>
-            <a:ext cx="6309003" cy="3962266"/>
-          </a:xfrm>
-        </p:spPr>
-        <p:txBody>
-          <a:bodyPr>
-            <a:normAutofit fontScale="92500" lnSpcReduction="10000"/>
-          </a:bodyPr>
-          <a:lstStyle/>
-          <a:p>
-            <a:pPr marL="0" indent="0">
-              <a:buNone/>
-            </a:pPr>
-            <a:r>
-              <a:rPr lang="en-US" sz="1600" dirty="0">
-                <a:solidFill>
-                  <a:schemeClr val="tx2"/>
-                </a:solidFill>
-              </a:rPr>
-              <a:t>Experiments (or ”</a:t>
-            </a:r>
-            <a:r>
-              <a:rPr lang="en-US" sz="1600" b="1" dirty="0">
-                <a:solidFill>
-                  <a:schemeClr val="tx2"/>
-                </a:solidFill>
-              </a:rPr>
-              <a:t>studies</a:t>
-            </a:r>
-            <a:r>
-              <a:rPr lang="en-US" sz="1600" dirty="0">
-                <a:solidFill>
-                  <a:schemeClr val="tx2"/>
-                </a:solidFill>
-              </a:rPr>
-              <a:t>”…we will use synonymously) are a building block for designing and confirming products.</a:t>
-            </a:r>
-          </a:p>
-          <a:p>
-            <a:pPr marL="0" indent="0">
-              <a:buNone/>
-            </a:pPr>
-            <a:r>
-              <a:rPr lang="en-US" sz="1600" dirty="0">
-                <a:solidFill>
-                  <a:schemeClr val="tx2"/>
-                </a:solidFill>
-              </a:rPr>
-              <a:t>Experiments have “</a:t>
-            </a:r>
-            <a:r>
-              <a:rPr lang="en-US" sz="1600" b="1" dirty="0">
-                <a:solidFill>
-                  <a:schemeClr val="tx2"/>
-                </a:solidFill>
-              </a:rPr>
-              <a:t>runs</a:t>
-            </a:r>
-            <a:r>
-              <a:rPr lang="en-US" sz="1600" dirty="0">
-                <a:solidFill>
-                  <a:schemeClr val="tx2"/>
-                </a:solidFill>
-              </a:rPr>
-              <a:t>” consisting of one or more conditions having controlled inputs such as the starting materials and test conditions</a:t>
-            </a:r>
-          </a:p>
-          <a:p>
-            <a:pPr marL="0" indent="0">
-              <a:buNone/>
-            </a:pPr>
-            <a:r>
-              <a:rPr lang="en-US" sz="1600" dirty="0">
-                <a:solidFill>
-                  <a:schemeClr val="tx2"/>
-                </a:solidFill>
-              </a:rPr>
-              <a:t>Each run can be described by a list of the “</a:t>
-            </a:r>
-            <a:r>
-              <a:rPr lang="en-US" sz="1600" b="1" dirty="0">
-                <a:solidFill>
-                  <a:schemeClr val="tx2"/>
-                </a:solidFill>
-              </a:rPr>
-              <a:t>run variable</a:t>
-            </a:r>
-            <a:r>
-              <a:rPr lang="en-US" sz="1600" dirty="0">
-                <a:solidFill>
-                  <a:schemeClr val="tx2"/>
-                </a:solidFill>
-              </a:rPr>
-              <a:t>” values which are the pre-set inputs and important ambient conditions recorded during the run.</a:t>
-            </a:r>
-          </a:p>
-          <a:p>
-            <a:pPr marL="0" indent="0">
-              <a:buNone/>
-            </a:pPr>
-            <a:r>
-              <a:rPr lang="en-US" sz="1600" dirty="0">
-                <a:solidFill>
-                  <a:schemeClr val="tx2"/>
-                </a:solidFill>
-              </a:rPr>
-              <a:t>Experiments generate “</a:t>
-            </a:r>
-            <a:r>
-              <a:rPr lang="en-US" sz="1600" b="1" dirty="0">
-                <a:solidFill>
-                  <a:schemeClr val="tx2"/>
-                </a:solidFill>
-              </a:rPr>
-              <a:t>raw data</a:t>
-            </a:r>
-            <a:r>
-              <a:rPr lang="en-US" sz="1600" dirty="0">
-                <a:solidFill>
-                  <a:schemeClr val="tx2"/>
-                </a:solidFill>
-              </a:rPr>
-              <a:t>” consisting of the original measurements to assess what happened (detailed speed versus time data for F1 car circuit around a track)</a:t>
-            </a:r>
-          </a:p>
-          <a:p>
-            <a:pPr marL="0" indent="0">
-              <a:buNone/>
-            </a:pPr>
-            <a:r>
-              <a:rPr lang="en-US" sz="1600" dirty="0">
-                <a:solidFill>
-                  <a:schemeClr val="tx2"/>
-                </a:solidFill>
-              </a:rPr>
-              <a:t>The raw data gets converted to “</a:t>
-            </a:r>
-            <a:r>
-              <a:rPr lang="en-US" sz="1600" b="1" dirty="0">
-                <a:solidFill>
-                  <a:schemeClr val="tx2"/>
-                </a:solidFill>
-              </a:rPr>
-              <a:t>parameterized data</a:t>
-            </a:r>
-            <a:r>
-              <a:rPr lang="en-US" sz="1600" dirty="0">
-                <a:solidFill>
-                  <a:schemeClr val="tx2"/>
-                </a:solidFill>
-              </a:rPr>
-              <a:t>” which is quantities reflecting the outcome (average speed for a complete track circuit)</a:t>
-            </a:r>
-          </a:p>
-          <a:p>
-            <a:pPr marL="0" indent="0">
-              <a:buNone/>
-            </a:pPr>
-            <a:r>
-              <a:rPr lang="en-US" sz="1600" dirty="0">
-                <a:solidFill>
-                  <a:schemeClr val="tx2"/>
-                </a:solidFill>
-              </a:rPr>
-              <a:t>The run variable values can be assembled into a “</a:t>
-            </a:r>
-            <a:r>
-              <a:rPr lang="en-US" sz="1600" b="1" dirty="0">
-                <a:solidFill>
-                  <a:schemeClr val="tx2"/>
-                </a:solidFill>
-              </a:rPr>
-              <a:t>run matrix</a:t>
-            </a:r>
-            <a:r>
-              <a:rPr lang="en-US" sz="1600" dirty="0">
-                <a:solidFill>
-                  <a:schemeClr val="tx2"/>
-                </a:solidFill>
-              </a:rPr>
-              <a:t>” with a row of values for each run</a:t>
-            </a:r>
-          </a:p>
-        </p:txBody>
-      </p:sp>
-      <p:pic>
-        <p:nvPicPr>
-          <p:cNvPr id="20" name="Picture 19" descr="Complex maths formulae on a blackboard">
-            <a:extLst>
-              <a:ext uri="{FF2B5EF4-FFF2-40B4-BE49-F238E27FC236}">
-                <a16:creationId xmlns:a16="http://schemas.microsoft.com/office/drawing/2014/main" id="{55773974-A9E5-8163-CE72-D16496B5EA24}"/>
-              </a:ext>
-            </a:extLst>
-          </p:cNvPr>
-          <p:cNvPicPr>
-            <a:picLocks noChangeAspect="1"/>
-          </p:cNvPicPr>
-          <p:nvPr/>
-        </p:nvPicPr>
-        <p:blipFill rotWithShape="1">
-          <a:blip r:embed="rId2"/>
-          <a:srcRect l="32103" r="18179" b="-1"/>
-          <a:stretch/>
-        </p:blipFill>
-        <p:spPr>
-          <a:xfrm>
-            <a:off x="7521283" y="10"/>
-            <a:ext cx="4670717" cy="6857990"/>
+            <a:spLocks noGrp="1" noRot="1" noChangeAspect="1" noMove="1" noResize="1" noEditPoints="1" noAdjustHandles="1" noChangeArrowheads="1" noChangeShapeType="1" noTextEdit="1"/>
+          </p:cNvSpPr>
+          <p:nvPr>
+            <p:extLst>
+              <p:ext uri="{386F3935-93C4-4BCD-93E2-E3B085C9AB24}">
+                <p16:designElem xmlns:p16="http://schemas.microsoft.com/office/powerpoint/2015/main" val="1"/>
+              </p:ext>
+            </p:extLst>
+          </p:nvPr>
+        </p:nvSpPr>
+        <p:spPr>
+          <a:xfrm>
+            <a:off x="4241830" y="457200"/>
+            <a:ext cx="3703320" cy="91440"/>
           </a:xfrm>
           <a:prstGeom prst="rect">
             <a:avLst/>
           </a:prstGeom>
-        </p:spPr>
-      </p:pic>
+          <a:solidFill>
+            <a:schemeClr val="accent1"/>
+          </a:solidFill>
+          <a:ln>
+            <a:noFill/>
+          </a:ln>
+          <a:effectLst/>
+        </p:spPr>
+        <p:style>
+          <a:lnRef idx="1">
+            <a:schemeClr val="accent1"/>
+          </a:lnRef>
+          <a:fillRef idx="3">
+            <a:schemeClr val="accent1"/>
+          </a:fillRef>
+          <a:effectRef idx="2">
+            <a:schemeClr val="accent1"/>
+          </a:effectRef>
+          <a:fontRef idx="minor">
+            <a:schemeClr val="lt1"/>
+          </a:fontRef>
+        </p:style>
+        <p:txBody>
+          <a:bodyPr/>
+          <a:lstStyle/>
+          <a:p>
+            <a:endParaRPr lang="en-US"/>
+          </a:p>
+        </p:txBody>
+      </p:sp>
+      <p:sp>
+        <p:nvSpPr>
+          <p:cNvPr id="16" name="Rectangle 15">
+            <a:extLst>
+              <a:ext uri="{FF2B5EF4-FFF2-40B4-BE49-F238E27FC236}">
+                <a16:creationId xmlns:a16="http://schemas.microsoft.com/office/drawing/2014/main" id="{A310A41F-3A14-4150-B6CF-0A577DDDEAD2}"/>
+              </a:ext>
+              <a:ext uri="{C183D7F6-B498-43B3-948B-1728B52AA6E4}">
+                <adec:decorative xmlns:adec="http://schemas.microsoft.com/office/drawing/2017/decorative" val="1"/>
+              </a:ext>
+            </a:extLst>
+          </p:cNvPr>
+          <p:cNvSpPr>
+            <a:spLocks noGrp="1" noRot="1" noChangeAspect="1" noMove="1" noResize="1" noEditPoints="1" noAdjustHandles="1" noChangeArrowheads="1" noChangeShapeType="1" noTextEdit="1"/>
+          </p:cNvSpPr>
+          <p:nvPr>
+            <p:extLst>
+              <p:ext uri="{386F3935-93C4-4BCD-93E2-E3B085C9AB24}">
+                <p16:designElem xmlns:p16="http://schemas.microsoft.com/office/powerpoint/2015/main" val="1"/>
+              </p:ext>
+            </p:extLst>
+          </p:nvPr>
+        </p:nvSpPr>
+        <p:spPr>
+          <a:xfrm>
+            <a:off x="8042147" y="453643"/>
+            <a:ext cx="3703320" cy="98554"/>
+          </a:xfrm>
+          <a:prstGeom prst="rect">
+            <a:avLst/>
+          </a:prstGeom>
+          <a:solidFill>
+            <a:srgbClr val="969FA7"/>
+          </a:solidFill>
+          <a:ln>
+            <a:noFill/>
+          </a:ln>
+          <a:effectLst/>
+        </p:spPr>
+        <p:style>
+          <a:lnRef idx="1">
+            <a:schemeClr val="accent1"/>
+          </a:lnRef>
+          <a:fillRef idx="3">
+            <a:schemeClr val="accent1"/>
+          </a:fillRef>
+          <a:effectRef idx="2">
+            <a:schemeClr val="accent1"/>
+          </a:effectRef>
+          <a:fontRef idx="minor">
+            <a:schemeClr val="lt1"/>
+          </a:fontRef>
+        </p:style>
+        <p:txBody>
+          <a:bodyPr/>
+          <a:lstStyle/>
+          <a:p>
+            <a:endParaRPr lang="en-US"/>
+          </a:p>
+        </p:txBody>
+      </p:sp>
+      <p:sp>
+        <p:nvSpPr>
+          <p:cNvPr id="18" name="Rectangle 17">
+            <a:extLst>
+              <a:ext uri="{FF2B5EF4-FFF2-40B4-BE49-F238E27FC236}">
+                <a16:creationId xmlns:a16="http://schemas.microsoft.com/office/drawing/2014/main" id="{7B89EEFD-93BC-4ACF-962C-E6279E72B00B}"/>
+              </a:ext>
+              <a:ext uri="{C183D7F6-B498-43B3-948B-1728B52AA6E4}">
+                <adec:decorative xmlns:adec="http://schemas.microsoft.com/office/drawing/2017/decorative" val="1"/>
+              </a:ext>
+            </a:extLst>
+          </p:cNvPr>
+          <p:cNvSpPr>
+            <a:spLocks noGrp="1" noRot="1" noChangeAspect="1" noMove="1" noResize="1" noEditPoints="1" noAdjustHandles="1" noChangeArrowheads="1" noChangeShapeType="1" noTextEdit="1"/>
+          </p:cNvSpPr>
+          <p:nvPr>
+            <p:extLst>
+              <p:ext uri="{386F3935-93C4-4BCD-93E2-E3B085C9AB24}">
+                <p16:designElem xmlns:p16="http://schemas.microsoft.com/office/powerpoint/2015/main" val="1"/>
+              </p:ext>
+            </p:extLst>
+          </p:nvPr>
+        </p:nvSpPr>
+        <p:spPr>
+          <a:xfrm>
+            <a:off x="461436" y="723899"/>
+            <a:ext cx="3703320" cy="5666666"/>
+          </a:xfrm>
+          <a:prstGeom prst="rect">
+            <a:avLst/>
+          </a:prstGeom>
+          <a:solidFill>
+            <a:srgbClr val="465359"/>
+          </a:solidFill>
+          <a:ln>
+            <a:noFill/>
+          </a:ln>
+          <a:effectLst/>
+        </p:spPr>
+        <p:style>
+          <a:lnRef idx="1">
+            <a:schemeClr val="accent1"/>
+          </a:lnRef>
+          <a:fillRef idx="3">
+            <a:schemeClr val="accent1"/>
+          </a:fillRef>
+          <a:effectRef idx="2">
+            <a:schemeClr val="accent1"/>
+          </a:effectRef>
+          <a:fontRef idx="minor">
+            <a:schemeClr val="lt1"/>
+          </a:fontRef>
+        </p:style>
+        <p:txBody>
+          <a:bodyPr/>
+          <a:lstStyle/>
+          <a:p>
+            <a:endParaRPr lang="en-US"/>
+          </a:p>
+        </p:txBody>
+      </p:sp>
+      <p:sp>
+        <p:nvSpPr>
+          <p:cNvPr id="2" name="Title 1">
+            <a:extLst>
+              <a:ext uri="{FF2B5EF4-FFF2-40B4-BE49-F238E27FC236}">
+                <a16:creationId xmlns:a16="http://schemas.microsoft.com/office/drawing/2014/main" id="{54EE378A-F88D-4129-A984-BE9F8C7B2BC5}"/>
+              </a:ext>
+            </a:extLst>
+          </p:cNvPr>
+          <p:cNvSpPr>
+            <a:spLocks noGrp="1"/>
+          </p:cNvSpPr>
+          <p:nvPr>
+            <p:ph type="title"/>
+          </p:nvPr>
+        </p:nvSpPr>
+        <p:spPr>
+          <a:xfrm>
+            <a:off x="803189" y="1209184"/>
+            <a:ext cx="3089189" cy="4734416"/>
+          </a:xfrm>
+        </p:spPr>
+        <p:txBody>
+          <a:bodyPr anchor="ctr">
+            <a:normAutofit/>
+          </a:bodyPr>
+          <a:lstStyle/>
+          <a:p>
+            <a:r>
+              <a:rPr lang="en-US" dirty="0">
+                <a:solidFill>
+                  <a:srgbClr val="FFFFFF"/>
+                </a:solidFill>
+              </a:rPr>
+              <a:t>What are Experiments?</a:t>
+            </a:r>
+          </a:p>
+        </p:txBody>
+      </p:sp>
+      <p:sp>
+        <p:nvSpPr>
+          <p:cNvPr id="3" name="Content Placeholder 2">
+            <a:extLst>
+              <a:ext uri="{FF2B5EF4-FFF2-40B4-BE49-F238E27FC236}">
+                <a16:creationId xmlns:a16="http://schemas.microsoft.com/office/drawing/2014/main" id="{F6CC5DE2-2678-4F40-A49A-D84BF4E75F4F}"/>
+              </a:ext>
+            </a:extLst>
+          </p:cNvPr>
+          <p:cNvSpPr>
+            <a:spLocks noGrp="1"/>
+          </p:cNvSpPr>
+          <p:nvPr>
+            <p:ph idx="1"/>
+          </p:nvPr>
+        </p:nvSpPr>
+        <p:spPr>
+          <a:xfrm>
+            <a:off x="4561870" y="723899"/>
+            <a:ext cx="7183597" cy="5128261"/>
+          </a:xfrm>
+        </p:spPr>
+        <p:txBody>
+          <a:bodyPr>
+            <a:normAutofit/>
+          </a:bodyPr>
+          <a:lstStyle/>
+          <a:p>
+            <a:pPr marL="0" indent="0">
+              <a:lnSpc>
+                <a:spcPct val="90000"/>
+              </a:lnSpc>
+              <a:buNone/>
+            </a:pPr>
+            <a:r>
+              <a:rPr lang="en-US" sz="1500" u="sng" dirty="0"/>
+              <a:t>Experiments Cover An amazing range for engineers and scientists!</a:t>
+            </a:r>
+          </a:p>
+          <a:p>
+            <a:pPr marL="0" indent="0">
+              <a:lnSpc>
+                <a:spcPct val="90000"/>
+              </a:lnSpc>
+              <a:buNone/>
+            </a:pPr>
+            <a:r>
+              <a:rPr lang="en-US" sz="1500" dirty="0"/>
+              <a:t>Make a production or lab-scale batch of several product formulations</a:t>
+            </a:r>
+          </a:p>
+          <a:p>
+            <a:pPr marL="0" indent="0">
+              <a:lnSpc>
+                <a:spcPct val="90000"/>
+              </a:lnSpc>
+              <a:buNone/>
+            </a:pPr>
+            <a:r>
+              <a:rPr lang="en-US" sz="1500" dirty="0"/>
+              <a:t>Run a packing line using pre-set conditions for a set amount of time</a:t>
+            </a:r>
+          </a:p>
+          <a:p>
+            <a:pPr marL="0" indent="0">
+              <a:lnSpc>
+                <a:spcPct val="90000"/>
+              </a:lnSpc>
+              <a:buNone/>
+            </a:pPr>
+            <a:r>
+              <a:rPr lang="en-US" sz="1500" dirty="0"/>
+              <a:t>Crash a sensor-equipped car into a wall</a:t>
+            </a:r>
+          </a:p>
+          <a:p>
+            <a:pPr marL="0" indent="0">
+              <a:lnSpc>
+                <a:spcPct val="90000"/>
+              </a:lnSpc>
+              <a:buNone/>
+            </a:pPr>
+            <a:r>
+              <a:rPr lang="en-US" sz="1500" dirty="0"/>
+              <a:t>Diaper a baby with several product designs</a:t>
+            </a:r>
+          </a:p>
+          <a:p>
+            <a:pPr marL="0" indent="0">
+              <a:lnSpc>
+                <a:spcPct val="90000"/>
+              </a:lnSpc>
+              <a:buNone/>
+            </a:pPr>
+            <a:r>
+              <a:rPr lang="en-US" sz="1500" dirty="0"/>
+              <a:t>Drive a F1 car around a track with several various fuel mixtures</a:t>
+            </a:r>
+          </a:p>
+          <a:p>
+            <a:pPr marL="0" indent="0">
+              <a:lnSpc>
+                <a:spcPct val="90000"/>
+              </a:lnSpc>
+              <a:buNone/>
+            </a:pPr>
+            <a:r>
+              <a:rPr lang="en-US" sz="1500" dirty="0"/>
+              <a:t>Ask a man to shave his face with 3 different types of razors on consecutive days</a:t>
+            </a:r>
+          </a:p>
+          <a:p>
+            <a:pPr marL="0" indent="0">
+              <a:lnSpc>
+                <a:spcPct val="90000"/>
+              </a:lnSpc>
+              <a:buNone/>
+            </a:pPr>
+            <a:r>
+              <a:rPr lang="en-US" sz="1500" dirty="0"/>
+              <a:t>Make batches of cookies with different types of chocolate</a:t>
+            </a:r>
+          </a:p>
+          <a:p>
+            <a:pPr marL="0" indent="0">
+              <a:lnSpc>
+                <a:spcPct val="90000"/>
+              </a:lnSpc>
+              <a:buNone/>
+            </a:pPr>
+            <a:r>
+              <a:rPr lang="en-US" sz="1500" dirty="0"/>
+              <a:t>Wash test, fabric swatches with different detergent formulations</a:t>
+            </a:r>
+          </a:p>
+          <a:p>
+            <a:pPr marL="0" indent="0">
+              <a:lnSpc>
+                <a:spcPct val="90000"/>
+              </a:lnSpc>
+              <a:buNone/>
+            </a:pPr>
+            <a:r>
+              <a:rPr lang="en-US" sz="1500" dirty="0"/>
+              <a:t>Use different catalysts to run a chemical conversion with the same starting materials</a:t>
+            </a:r>
+          </a:p>
+          <a:p>
+            <a:pPr marL="0" indent="0">
+              <a:lnSpc>
+                <a:spcPct val="90000"/>
+              </a:lnSpc>
+              <a:buNone/>
+            </a:pPr>
+            <a:r>
+              <a:rPr lang="en-US" sz="1500" dirty="0"/>
+              <a:t>Use PCR to replicate and sequence the DNA from multiple virus samples</a:t>
+            </a:r>
+          </a:p>
+          <a:p>
+            <a:pPr marL="0" indent="0">
+              <a:lnSpc>
+                <a:spcPct val="90000"/>
+              </a:lnSpc>
+              <a:buNone/>
+            </a:pPr>
+            <a:r>
+              <a:rPr lang="en-US" sz="1500" dirty="0"/>
+              <a:t>Mop floors with mops using different cleaning solutions</a:t>
+            </a:r>
+          </a:p>
+          <a:p>
+            <a:pPr marL="0" indent="0">
+              <a:lnSpc>
+                <a:spcPct val="90000"/>
+              </a:lnSpc>
+              <a:buNone/>
+            </a:pPr>
+            <a:r>
+              <a:rPr lang="en-US" sz="1500" dirty="0"/>
+              <a:t>Surgically implant artificial joints using different polymeric coatings</a:t>
+            </a:r>
+          </a:p>
+        </p:txBody>
+      </p:sp>
     </p:spTree>
     <p:extLst>
       <p:ext uri="{BB962C8B-B14F-4D97-AF65-F5344CB8AC3E}">
-        <p14:creationId xmlns:p14="http://schemas.microsoft.com/office/powerpoint/2010/main" val="3978584485"/>
+        <p14:creationId xmlns:p14="http://schemas.microsoft.com/office/powerpoint/2010/main" val="1437473056"/>
       </p:ext>
     </p:extLst>
   </p:cSld>
@@ -6393,6 +6530,436 @@
           <a:chExt cx="0" cy="0"/>
         </a:xfrm>
       </p:grpSpPr>
+      <p:sp useBgFill="1">
+        <p:nvSpPr>
+          <p:cNvPr id="24" name="Rectangle 23">
+            <a:extLst>
+              <a:ext uri="{FF2B5EF4-FFF2-40B4-BE49-F238E27FC236}">
+                <a16:creationId xmlns:a16="http://schemas.microsoft.com/office/drawing/2014/main" id="{504BED40-EAF7-4E55-AFF7-2CD840EBD3AA}"/>
+              </a:ext>
+              <a:ext uri="{C183D7F6-B498-43B3-948B-1728B52AA6E4}">
+                <adec:decorative xmlns:adec="http://schemas.microsoft.com/office/drawing/2017/decorative" val="1"/>
+              </a:ext>
+            </a:extLst>
+          </p:cNvPr>
+          <p:cNvSpPr>
+            <a:spLocks noGrp="1" noRot="1" noChangeAspect="1" noMove="1" noResize="1" noEditPoints="1" noAdjustHandles="1" noChangeArrowheads="1" noChangeShapeType="1" noTextEdit="1"/>
+          </p:cNvSpPr>
+          <p:nvPr>
+            <p:extLst>
+              <p:ext uri="{386F3935-93C4-4BCD-93E2-E3B085C9AB24}">
+                <p16:designElem xmlns:p16="http://schemas.microsoft.com/office/powerpoint/2015/main" val="1"/>
+              </p:ext>
+            </p:extLst>
+          </p:nvPr>
+        </p:nvSpPr>
+        <p:spPr>
+          <a:xfrm>
+            <a:off x="0" y="0"/>
+            <a:ext cx="12192000" cy="6858000"/>
+          </a:xfrm>
+          <a:prstGeom prst="rect">
+            <a:avLst/>
+          </a:prstGeom>
+          <a:ln>
+            <a:noFill/>
+          </a:ln>
+        </p:spPr>
+        <p:style>
+          <a:lnRef idx="2">
+            <a:schemeClr val="accent1">
+              <a:shade val="50000"/>
+            </a:schemeClr>
+          </a:lnRef>
+          <a:fillRef idx="1">
+            <a:schemeClr val="accent1"/>
+          </a:fillRef>
+          <a:effectRef idx="0">
+            <a:schemeClr val="accent1"/>
+          </a:effectRef>
+          <a:fontRef idx="minor">
+            <a:schemeClr val="lt1"/>
+          </a:fontRef>
+        </p:style>
+        <p:txBody>
+          <a:bodyPr rtlCol="0" anchor="ctr"/>
+          <a:lstStyle/>
+          <a:p>
+            <a:pPr algn="ctr"/>
+            <a:endParaRPr lang="en-US"/>
+          </a:p>
+        </p:txBody>
+      </p:sp>
+      <p:sp>
+        <p:nvSpPr>
+          <p:cNvPr id="2" name="Title 1">
+            <a:extLst>
+              <a:ext uri="{FF2B5EF4-FFF2-40B4-BE49-F238E27FC236}">
+                <a16:creationId xmlns:a16="http://schemas.microsoft.com/office/drawing/2014/main" id="{54EE378A-F88D-4129-A984-BE9F8C7B2BC5}"/>
+              </a:ext>
+            </a:extLst>
+          </p:cNvPr>
+          <p:cNvSpPr>
+            <a:spLocks noGrp="1"/>
+          </p:cNvSpPr>
+          <p:nvPr>
+            <p:ph type="title"/>
+          </p:nvPr>
+        </p:nvSpPr>
+        <p:spPr>
+          <a:xfrm>
+            <a:off x="581193" y="702156"/>
+            <a:ext cx="6309003" cy="1013800"/>
+          </a:xfrm>
+        </p:spPr>
+        <p:txBody>
+          <a:bodyPr>
+            <a:normAutofit/>
+          </a:bodyPr>
+          <a:lstStyle/>
+          <a:p>
+            <a:r>
+              <a:rPr lang="en-US">
+                <a:solidFill>
+                  <a:schemeClr val="tx2"/>
+                </a:solidFill>
+              </a:rPr>
+              <a:t>What Do these have in common?</a:t>
+            </a:r>
+          </a:p>
+        </p:txBody>
+      </p:sp>
+      <p:sp>
+        <p:nvSpPr>
+          <p:cNvPr id="26" name="Rectangle 25">
+            <a:extLst>
+              <a:ext uri="{FF2B5EF4-FFF2-40B4-BE49-F238E27FC236}">
+                <a16:creationId xmlns:a16="http://schemas.microsoft.com/office/drawing/2014/main" id="{F367CCF1-BB1E-41CF-8499-94A870C33EFA}"/>
+              </a:ext>
+              <a:ext uri="{C183D7F6-B498-43B3-948B-1728B52AA6E4}">
+                <adec:decorative xmlns:adec="http://schemas.microsoft.com/office/drawing/2017/decorative" val="1"/>
+              </a:ext>
+            </a:extLst>
+          </p:cNvPr>
+          <p:cNvSpPr>
+            <a:spLocks noGrp="1" noRot="1" noChangeAspect="1" noMove="1" noResize="1" noEditPoints="1" noAdjustHandles="1" noChangeArrowheads="1" noChangeShapeType="1" noTextEdit="1"/>
+          </p:cNvSpPr>
+          <p:nvPr>
+            <p:extLst>
+              <p:ext uri="{386F3935-93C4-4BCD-93E2-E3B085C9AB24}">
+                <p16:designElem xmlns:p16="http://schemas.microsoft.com/office/powerpoint/2015/main" val="1"/>
+              </p:ext>
+            </p:extLst>
+          </p:nvPr>
+        </p:nvSpPr>
+        <p:spPr>
+          <a:xfrm>
+            <a:off x="446534" y="457200"/>
+            <a:ext cx="6675120" cy="94997"/>
+          </a:xfrm>
+          <a:prstGeom prst="rect">
+            <a:avLst/>
+          </a:prstGeom>
+          <a:solidFill>
+            <a:schemeClr val="accent1"/>
+          </a:solidFill>
+          <a:ln>
+            <a:noFill/>
+          </a:ln>
+          <a:effectLst/>
+        </p:spPr>
+        <p:style>
+          <a:lnRef idx="1">
+            <a:schemeClr val="accent1"/>
+          </a:lnRef>
+          <a:fillRef idx="3">
+            <a:schemeClr val="accent1"/>
+          </a:fillRef>
+          <a:effectRef idx="2">
+            <a:schemeClr val="accent1"/>
+          </a:effectRef>
+          <a:fontRef idx="minor">
+            <a:schemeClr val="lt1"/>
+          </a:fontRef>
+        </p:style>
+        <p:txBody>
+          <a:bodyPr/>
+          <a:lstStyle/>
+          <a:p>
+            <a:endParaRPr lang="en-US"/>
+          </a:p>
+        </p:txBody>
+      </p:sp>
+      <p:sp>
+        <p:nvSpPr>
+          <p:cNvPr id="3" name="Content Placeholder 2">
+            <a:extLst>
+              <a:ext uri="{FF2B5EF4-FFF2-40B4-BE49-F238E27FC236}">
+                <a16:creationId xmlns:a16="http://schemas.microsoft.com/office/drawing/2014/main" id="{F6CC5DE2-2678-4F40-A49A-D84BF4E75F4F}"/>
+              </a:ext>
+            </a:extLst>
+          </p:cNvPr>
+          <p:cNvSpPr>
+            <a:spLocks noGrp="1"/>
+          </p:cNvSpPr>
+          <p:nvPr>
+            <p:ph idx="1"/>
+          </p:nvPr>
+        </p:nvSpPr>
+        <p:spPr>
+          <a:xfrm>
+            <a:off x="581194" y="1896533"/>
+            <a:ext cx="6309003" cy="3962266"/>
+          </a:xfrm>
+        </p:spPr>
+        <p:txBody>
+          <a:bodyPr>
+            <a:normAutofit fontScale="92500" lnSpcReduction="10000"/>
+          </a:bodyPr>
+          <a:lstStyle/>
+          <a:p>
+            <a:pPr marL="0" indent="0">
+              <a:buNone/>
+            </a:pPr>
+            <a:r>
+              <a:rPr lang="en-US" sz="1600" dirty="0">
+                <a:solidFill>
+                  <a:schemeClr val="tx2"/>
+                </a:solidFill>
+              </a:rPr>
+              <a:t>Experiments (or ”</a:t>
+            </a:r>
+            <a:r>
+              <a:rPr lang="en-US" sz="1600" b="1" dirty="0">
+                <a:solidFill>
+                  <a:schemeClr val="tx2"/>
+                </a:solidFill>
+              </a:rPr>
+              <a:t>studies</a:t>
+            </a:r>
+            <a:r>
+              <a:rPr lang="en-US" sz="1600" dirty="0">
+                <a:solidFill>
+                  <a:schemeClr val="tx2"/>
+                </a:solidFill>
+              </a:rPr>
+              <a:t>”…we will use synonymously) are a building block for designing and confirming products.</a:t>
+            </a:r>
+          </a:p>
+          <a:p>
+            <a:pPr marL="0" indent="0">
+              <a:buNone/>
+            </a:pPr>
+            <a:r>
+              <a:rPr lang="en-US" sz="1600" dirty="0">
+                <a:solidFill>
+                  <a:schemeClr val="tx2"/>
+                </a:solidFill>
+              </a:rPr>
+              <a:t>Experiments have “</a:t>
+            </a:r>
+            <a:r>
+              <a:rPr lang="en-US" sz="1600" b="1" dirty="0">
+                <a:solidFill>
+                  <a:schemeClr val="tx2"/>
+                </a:solidFill>
+              </a:rPr>
+              <a:t>runs</a:t>
+            </a:r>
+            <a:r>
+              <a:rPr lang="en-US" sz="1600" dirty="0">
+                <a:solidFill>
+                  <a:schemeClr val="tx2"/>
+                </a:solidFill>
+              </a:rPr>
+              <a:t>” consisting of one or more conditions having controlled inputs such as the starting materials and test conditions</a:t>
+            </a:r>
+          </a:p>
+          <a:p>
+            <a:pPr marL="0" indent="0">
+              <a:buNone/>
+            </a:pPr>
+            <a:r>
+              <a:rPr lang="en-US" sz="1600" dirty="0">
+                <a:solidFill>
+                  <a:schemeClr val="tx2"/>
+                </a:solidFill>
+              </a:rPr>
+              <a:t>Each run can be described by a list of the “</a:t>
+            </a:r>
+            <a:r>
+              <a:rPr lang="en-US" sz="1600" b="1" dirty="0">
+                <a:solidFill>
+                  <a:schemeClr val="tx2"/>
+                </a:solidFill>
+              </a:rPr>
+              <a:t>run variable</a:t>
+            </a:r>
+            <a:r>
+              <a:rPr lang="en-US" sz="1600" dirty="0">
+                <a:solidFill>
+                  <a:schemeClr val="tx2"/>
+                </a:solidFill>
+              </a:rPr>
+              <a:t>” values which are the pre-set inputs and important ambient conditions recorded during the run.</a:t>
+            </a:r>
+          </a:p>
+          <a:p>
+            <a:pPr marL="0" indent="0">
+              <a:buNone/>
+            </a:pPr>
+            <a:r>
+              <a:rPr lang="en-US" sz="1600" dirty="0">
+                <a:solidFill>
+                  <a:schemeClr val="tx2"/>
+                </a:solidFill>
+              </a:rPr>
+              <a:t>Experiments generate “</a:t>
+            </a:r>
+            <a:r>
+              <a:rPr lang="en-US" sz="1600" b="1" dirty="0">
+                <a:solidFill>
+                  <a:schemeClr val="tx2"/>
+                </a:solidFill>
+              </a:rPr>
+              <a:t>raw data</a:t>
+            </a:r>
+            <a:r>
+              <a:rPr lang="en-US" sz="1600" dirty="0">
+                <a:solidFill>
+                  <a:schemeClr val="tx2"/>
+                </a:solidFill>
+              </a:rPr>
+              <a:t>” consisting of the original measurements to assess what happened (detailed speed versus time data for F1 car circuit around a track)</a:t>
+            </a:r>
+          </a:p>
+          <a:p>
+            <a:pPr marL="0" indent="0">
+              <a:buNone/>
+            </a:pPr>
+            <a:r>
+              <a:rPr lang="en-US" sz="1600" dirty="0">
+                <a:solidFill>
+                  <a:schemeClr val="tx2"/>
+                </a:solidFill>
+              </a:rPr>
+              <a:t>The raw data gets converted to “</a:t>
+            </a:r>
+            <a:r>
+              <a:rPr lang="en-US" sz="1600" b="1" dirty="0">
+                <a:solidFill>
+                  <a:schemeClr val="tx2"/>
+                </a:solidFill>
+              </a:rPr>
+              <a:t>parameterized data</a:t>
+            </a:r>
+            <a:r>
+              <a:rPr lang="en-US" sz="1600" dirty="0">
+                <a:solidFill>
+                  <a:schemeClr val="tx2"/>
+                </a:solidFill>
+              </a:rPr>
+              <a:t>” which is quantities reflecting the outcome (average speed for a complete track circuit)</a:t>
+            </a:r>
+          </a:p>
+          <a:p>
+            <a:pPr marL="0" indent="0">
+              <a:buNone/>
+            </a:pPr>
+            <a:r>
+              <a:rPr lang="en-US" sz="1600" dirty="0">
+                <a:solidFill>
+                  <a:schemeClr val="tx2"/>
+                </a:solidFill>
+              </a:rPr>
+              <a:t>The run variable values can be assembled into a “</a:t>
+            </a:r>
+            <a:r>
+              <a:rPr lang="en-US" sz="1600" b="1" dirty="0">
+                <a:solidFill>
+                  <a:schemeClr val="tx2"/>
+                </a:solidFill>
+              </a:rPr>
+              <a:t>run matrix</a:t>
+            </a:r>
+            <a:r>
+              <a:rPr lang="en-US" sz="1600" dirty="0">
+                <a:solidFill>
+                  <a:schemeClr val="tx2"/>
+                </a:solidFill>
+              </a:rPr>
+              <a:t>” with a row of values for each run</a:t>
+            </a:r>
+          </a:p>
+        </p:txBody>
+      </p:sp>
+      <p:pic>
+        <p:nvPicPr>
+          <p:cNvPr id="20" name="Picture 19" descr="Complex maths formulae on a blackboard">
+            <a:extLst>
+              <a:ext uri="{FF2B5EF4-FFF2-40B4-BE49-F238E27FC236}">
+                <a16:creationId xmlns:a16="http://schemas.microsoft.com/office/drawing/2014/main" id="{55773974-A9E5-8163-CE72-D16496B5EA24}"/>
+              </a:ext>
+            </a:extLst>
+          </p:cNvPr>
+          <p:cNvPicPr>
+            <a:picLocks noChangeAspect="1"/>
+          </p:cNvPicPr>
+          <p:nvPr/>
+        </p:nvPicPr>
+        <p:blipFill rotWithShape="1">
+          <a:blip r:embed="rId2"/>
+          <a:srcRect l="32103" r="18179" b="-1"/>
+          <a:stretch/>
+        </p:blipFill>
+        <p:spPr>
+          <a:xfrm>
+            <a:off x="7521283" y="10"/>
+            <a:ext cx="4670717" cy="6857990"/>
+          </a:xfrm>
+          <a:prstGeom prst="rect">
+            <a:avLst/>
+          </a:prstGeom>
+        </p:spPr>
+      </p:pic>
+    </p:spTree>
+    <p:extLst>
+      <p:ext uri="{BB962C8B-B14F-4D97-AF65-F5344CB8AC3E}">
+        <p14:creationId xmlns:p14="http://schemas.microsoft.com/office/powerpoint/2010/main" val="3978584485"/>
+      </p:ext>
+    </p:extLst>
+  </p:cSld>
+  <p:clrMapOvr>
+    <a:masterClrMapping/>
+  </p:clrMapOvr>
+</p:sld>
+</file>
+
+<file path=ppt/slides/slide12.xml><?xml version="1.0" encoding="utf-8"?>
+<p:sld xmlns:a="http://schemas.openxmlformats.org/drawingml/2006/main" xmlns:r="http://schemas.openxmlformats.org/officeDocument/2006/relationships" xmlns:p="http://schemas.openxmlformats.org/presentationml/2006/main">
+  <p:cSld>
+    <p:bg>
+      <p:bgPr>
+        <a:solidFill>
+          <a:schemeClr val="bg1"/>
+        </a:solidFill>
+        <a:effectLst/>
+      </p:bgPr>
+    </p:bg>
+    <p:spTree>
+      <p:nvGrpSpPr>
+        <p:cNvPr id="1" name=""/>
+        <p:cNvGrpSpPr/>
+        <p:nvPr/>
+      </p:nvGrpSpPr>
+      <p:grpSpPr>
+        <a:xfrm>
+          <a:off x="0" y="0"/>
+          <a:ext cx="0" cy="0"/>
+          <a:chOff x="0" y="0"/>
+          <a:chExt cx="0" cy="0"/>
+        </a:xfrm>
+      </p:grpSpPr>
       <p:sp>
         <p:nvSpPr>
           <p:cNvPr id="2" name="Title 1">
@@ -6475,7 +7042,7 @@
 </p:sld>
 </file>
 
-<file path=ppt/slides/slide12.xml><?xml version="1.0" encoding="utf-8"?>
+<file path=ppt/slides/slide13.xml><?xml version="1.0" encoding="utf-8"?>
 <p:sld xmlns:a="http://schemas.openxmlformats.org/drawingml/2006/main" xmlns:r="http://schemas.openxmlformats.org/officeDocument/2006/relationships" xmlns:p="http://schemas.openxmlformats.org/presentationml/2006/main">
   <p:cSld>
     <p:bg>
@@ -7784,7 +8351,7 @@
                   <a:srgbClr val="FFFFFF"/>
                 </a:solidFill>
               </a:rPr>
-              <a:t>Software Recommendations by Use Case</a:t>
+              <a:t>Additional Software Recommendations</a:t>
             </a:r>
           </a:p>
         </p:txBody>
@@ -7977,7 +8544,7 @@
             </a:pPr>
             <a:r>
               <a:rPr lang="en-US" u="sng" dirty="0"/>
-              <a:t>Useful Python libraries for Engineers</a:t>
+              <a:t>Useful Python libraries for Engineers and Scientists</a:t>
             </a:r>
           </a:p>
           <a:p>
@@ -7986,7 +8553,7 @@
             </a:pPr>
             <a:r>
               <a:rPr lang="en-US" dirty="0"/>
-              <a:t>You get most of these with Anaconda installation!!</a:t>
+              <a:t>You can get these with Anaconda installation!!</a:t>
             </a:r>
           </a:p>
           <a:p>
@@ -8286,7 +8853,7 @@
           <a:p>
             <a:r>
               <a:rPr lang="en-US" dirty="0"/>
-              <a:t>Installing Packages (AKA Libraries) In Anaconda</a:t>
+              <a:t>Example: Python Regex Package to Extract Strings</a:t>
             </a:r>
           </a:p>
         </p:txBody>
@@ -8304,10 +8871,15 @@
             <a:spLocks noGrp="1"/>
           </p:cNvSpPr>
           <p:nvPr>
-            <p:ph idx="1"/>
-          </p:nvPr>
-        </p:nvSpPr>
-        <p:spPr/>
+            <p:ph sz="half" idx="1"/>
+          </p:nvPr>
+        </p:nvSpPr>
+        <p:spPr>
+          <a:xfrm>
+            <a:off x="581193" y="1882588"/>
+            <a:ext cx="6031786" cy="2000923"/>
+          </a:xfrm>
+        </p:spPr>
         <p:txBody>
           <a:bodyPr>
             <a:normAutofit/>
@@ -8318,10 +8890,31 @@
               <a:buNone/>
             </a:pPr>
             <a:r>
-              <a:rPr lang="en-US" u="sng" dirty="0"/>
-              <a:t>=</a:t>
-            </a:r>
-            <a:endParaRPr lang="en-US" dirty="0"/>
+              <a:rPr lang="en-US" dirty="0"/>
+              <a:t>Lab instrument software outputs IDs in string needing cleanup</a:t>
+            </a:r>
+          </a:p>
+          <a:p>
+            <a:pPr marL="0" indent="0">
+              <a:buNone/>
+            </a:pPr>
+            <a:r>
+              <a:rPr lang="en-US" b="1" dirty="0"/>
+              <a:t>regex</a:t>
+            </a:r>
+            <a:r>
+              <a:rPr lang="en-US" dirty="0"/>
+              <a:t> Python package can strip out unneeded quotation marks, spaces and (not shown) file extension</a:t>
+            </a:r>
+          </a:p>
+          <a:p>
+            <a:pPr marL="0" indent="0">
+              <a:buNone/>
+            </a:pPr>
+            <a:r>
+              <a:rPr lang="en-US" dirty="0"/>
+              <a:t>(Not shown) Either regex or Python split() command can break the string into pieces using underscore characters as delimiters</a:t>
+            </a:r>
           </a:p>
           <a:p>
             <a:endParaRPr lang="en-US" dirty="0"/>
@@ -8330,10 +8923,10 @@
       </p:sp>
       <p:pic>
         <p:nvPicPr>
-          <p:cNvPr id="9" name="Picture 8" descr="A screenshot of a computer&#10;&#10;Description automatically generated">
+          <p:cNvPr id="14" name="Picture 13" descr="A blue background with white numbers&#10;&#10;Description automatically generated">
             <a:extLst>
               <a:ext uri="{FF2B5EF4-FFF2-40B4-BE49-F238E27FC236}">
-                <a16:creationId xmlns:a16="http://schemas.microsoft.com/office/drawing/2014/main" id="{11A4757E-E86F-31E2-4B0C-8EE3F9DD708B}"/>
+                <a16:creationId xmlns:a16="http://schemas.microsoft.com/office/drawing/2014/main" id="{08C6BF78-A7C1-F58F-087A-30DE0D3EC20C}"/>
               </a:ext>
             </a:extLst>
           </p:cNvPr>
@@ -8356,8 +8949,8 @@
         </p:blipFill>
         <p:spPr>
           <a:xfrm>
-            <a:off x="304494" y="2016199"/>
-            <a:ext cx="7772400" cy="1595918"/>
+            <a:off x="10343724" y="1338362"/>
+            <a:ext cx="1405160" cy="296326"/>
           </a:xfrm>
           <a:prstGeom prst="rect">
             <a:avLst/>
@@ -8366,17 +8959,19 @@
       </p:pic>
       <p:pic>
         <p:nvPicPr>
-          <p:cNvPr id="13" name="Picture 12" descr="A screenshot of a chat&#10;&#10;Description automatically generated">
+          <p:cNvPr id="9" name="Content Placeholder 8" descr="A white background with black and white clouds&#10;&#10;Description automatically generated with medium confidence">
             <a:extLst>
               <a:ext uri="{FF2B5EF4-FFF2-40B4-BE49-F238E27FC236}">
-                <a16:creationId xmlns:a16="http://schemas.microsoft.com/office/drawing/2014/main" id="{84FEC610-6940-969C-4790-A917154A9A01}"/>
+                <a16:creationId xmlns:a16="http://schemas.microsoft.com/office/drawing/2014/main" id="{EBE6547B-3CE6-11E5-04F1-DCC40A366935}"/>
               </a:ext>
             </a:extLst>
           </p:cNvPr>
           <p:cNvPicPr>
-            <a:picLocks noChangeAspect="1"/>
+            <a:picLocks noGrp="1" noChangeAspect="1"/>
           </p:cNvPicPr>
-          <p:nvPr/>
+          <p:nvPr>
+            <p:ph sz="half" idx="2"/>
+          </p:nvPr>
         </p:nvPicPr>
         <p:blipFill>
           <a:blip r:embed="rId3">
@@ -8392,20 +8987,17 @@
         </p:blipFill>
         <p:spPr>
           <a:xfrm>
-            <a:off x="735707" y="3818438"/>
-            <a:ext cx="6459632" cy="1457172"/>
-          </a:xfrm>
-          <a:prstGeom prst="rect">
-            <a:avLst/>
-          </a:prstGeom>
+            <a:off x="6606540" y="1989866"/>
+            <a:ext cx="5585460" cy="1059180"/>
+          </a:xfrm>
         </p:spPr>
       </p:pic>
       <p:pic>
         <p:nvPicPr>
-          <p:cNvPr id="16" name="Picture 15" descr="A screenshot of a package&#10;&#10;Description automatically generated">
+          <p:cNvPr id="13" name="Picture 12" descr="A screenshot of a computer code&#10;&#10;Description automatically generated">
             <a:extLst>
               <a:ext uri="{FF2B5EF4-FFF2-40B4-BE49-F238E27FC236}">
-                <a16:creationId xmlns:a16="http://schemas.microsoft.com/office/drawing/2014/main" id="{0C601E31-1C82-84A2-304F-8741B4E9E9BE}"/>
+                <a16:creationId xmlns:a16="http://schemas.microsoft.com/office/drawing/2014/main" id="{D2FC54DF-FF4A-68A8-D296-BB2E38FE14F2}"/>
               </a:ext>
             </a:extLst>
           </p:cNvPr>
@@ -8428,20 +9020,124 @@
         </p:blipFill>
         <p:spPr>
           <a:xfrm>
-            <a:off x="8341926" y="3948362"/>
-            <a:ext cx="2959780" cy="2430135"/>
+            <a:off x="6637020" y="3271467"/>
+            <a:ext cx="5554980" cy="2529840"/>
           </a:xfrm>
           <a:prstGeom prst="rect">
             <a:avLst/>
           </a:prstGeom>
         </p:spPr>
       </p:pic>
+      <p:sp>
+        <p:nvSpPr>
+          <p:cNvPr id="15" name="Rounded Rectangle 14">
+            <a:extLst>
+              <a:ext uri="{FF2B5EF4-FFF2-40B4-BE49-F238E27FC236}">
+                <a16:creationId xmlns:a16="http://schemas.microsoft.com/office/drawing/2014/main" id="{2416EC8B-C169-4E5F-FA80-F723727E512E}"/>
+              </a:ext>
+            </a:extLst>
+          </p:cNvPr>
+          <p:cNvSpPr/>
+          <p:nvPr/>
+        </p:nvSpPr>
+        <p:spPr>
+          <a:xfrm>
+            <a:off x="7124716" y="2695351"/>
+            <a:ext cx="1233959" cy="176941"/>
+          </a:xfrm>
+          <a:prstGeom prst="roundRect">
+            <a:avLst/>
+          </a:prstGeom>
+          <a:noFill/>
+          <a:ln w="12700">
+            <a:solidFill>
+              <a:srgbClr val="FF0000"/>
+            </a:solidFill>
+          </a:ln>
+        </p:spPr>
+        <p:style>
+          <a:lnRef idx="2">
+            <a:schemeClr val="accent1">
+              <a:shade val="15000"/>
+            </a:schemeClr>
+          </a:lnRef>
+          <a:fillRef idx="1">
+            <a:schemeClr val="accent1"/>
+          </a:fillRef>
+          <a:effectRef idx="0">
+            <a:schemeClr val="accent1"/>
+          </a:effectRef>
+          <a:fontRef idx="minor">
+            <a:schemeClr val="lt1"/>
+          </a:fontRef>
+        </p:style>
+        <p:txBody>
+          <a:bodyPr rtlCol="0" anchor="ctr"/>
+          <a:lstStyle/>
+          <a:p>
+            <a:pPr algn="ctr"/>
+            <a:endParaRPr lang="en-US"/>
+          </a:p>
+        </p:txBody>
+      </p:sp>
+      <p:sp>
+        <p:nvSpPr>
+          <p:cNvPr id="16" name="Rounded Rectangle 15">
+            <a:extLst>
+              <a:ext uri="{FF2B5EF4-FFF2-40B4-BE49-F238E27FC236}">
+                <a16:creationId xmlns:a16="http://schemas.microsoft.com/office/drawing/2014/main" id="{DB7540F8-0410-3499-9BF7-473BB9A817B1}"/>
+              </a:ext>
+            </a:extLst>
+          </p:cNvPr>
+          <p:cNvSpPr/>
+          <p:nvPr/>
+        </p:nvSpPr>
+        <p:spPr>
+          <a:xfrm>
+            <a:off x="7543180" y="5085315"/>
+            <a:ext cx="3904488" cy="502920"/>
+          </a:xfrm>
+          <a:prstGeom prst="roundRect">
+            <a:avLst/>
+          </a:prstGeom>
+          <a:noFill/>
+          <a:ln w="12700">
+            <a:solidFill>
+              <a:srgbClr val="FF0000"/>
+            </a:solidFill>
+          </a:ln>
+        </p:spPr>
+        <p:style>
+          <a:lnRef idx="2">
+            <a:schemeClr val="accent1">
+              <a:shade val="15000"/>
+            </a:schemeClr>
+          </a:lnRef>
+          <a:fillRef idx="1">
+            <a:schemeClr val="accent1"/>
+          </a:fillRef>
+          <a:effectRef idx="0">
+            <a:schemeClr val="accent1"/>
+          </a:effectRef>
+          <a:fontRef idx="minor">
+            <a:schemeClr val="lt1"/>
+          </a:fontRef>
+        </p:style>
+        <p:txBody>
+          <a:bodyPr rtlCol="0" anchor="ctr"/>
+          <a:lstStyle/>
+          <a:p>
+            <a:pPr algn="ctr"/>
+            <a:endParaRPr lang="en-US"/>
+          </a:p>
+        </p:txBody>
+      </p:sp>
       <p:pic>
         <p:nvPicPr>
-          <p:cNvPr id="20" name="Picture 19" descr="A screenshot of a computer&#10;&#10;Description automatically generated">
+          <p:cNvPr id="18" name="Picture 17" descr="A screenshot of a computer&#10;&#10;Description automatically generated">
             <a:extLst>
               <a:ext uri="{FF2B5EF4-FFF2-40B4-BE49-F238E27FC236}">
-                <a16:creationId xmlns:a16="http://schemas.microsoft.com/office/drawing/2014/main" id="{45CC4F3C-7B49-B042-B681-3A3099DFEFB0}"/>
+                <a16:creationId xmlns:a16="http://schemas.microsoft.com/office/drawing/2014/main" id="{C5FF7A18-9660-EEC6-8619-48EFFC29B3F3}"/>
               </a:ext>
             </a:extLst>
           </p:cNvPr>
@@ -8464,480 +9160,103 @@
         </p:blipFill>
         <p:spPr>
           <a:xfrm>
-            <a:off x="8128959" y="2416293"/>
-            <a:ext cx="3758546" cy="1132445"/>
+            <a:off x="1039091" y="3673148"/>
+            <a:ext cx="5092194" cy="3018107"/>
           </a:xfrm>
           <a:prstGeom prst="rect">
             <a:avLst/>
           </a:prstGeom>
         </p:spPr>
       </p:pic>
-      <p:sp>
-        <p:nvSpPr>
-          <p:cNvPr id="21" name="Oval 20">
+      <p:cxnSp>
+        <p:nvCxnSpPr>
+          <p:cNvPr id="19" name="Straight Arrow Connector 18">
             <a:extLst>
               <a:ext uri="{FF2B5EF4-FFF2-40B4-BE49-F238E27FC236}">
-                <a16:creationId xmlns:a16="http://schemas.microsoft.com/office/drawing/2014/main" id="{F58594C9-543D-03D5-5D8D-D5FECE1F063C}"/>
+                <a16:creationId xmlns:a16="http://schemas.microsoft.com/office/drawing/2014/main" id="{7B6878D9-496D-CC56-7EF2-786C9E83A6D5}"/>
               </a:ext>
             </a:extLst>
           </p:cNvPr>
-          <p:cNvSpPr/>
+          <p:cNvCxnSpPr>
+            <a:cxnSpLocks/>
+          </p:cNvCxnSpPr>
           <p:nvPr/>
-        </p:nvSpPr>
-        <p:spPr>
-          <a:xfrm>
-            <a:off x="870331" y="1994962"/>
-            <a:ext cx="352539" cy="352539"/>
-          </a:xfrm>
-          <a:prstGeom prst="ellipse">
+        </p:nvCxnSpPr>
+        <p:spPr>
+          <a:xfrm flipH="1">
+            <a:off x="9796607" y="4345767"/>
+            <a:ext cx="463294" cy="0"/>
+          </a:xfrm>
+          <a:prstGeom prst="straightConnector1">
+            <a:avLst/>
+          </a:prstGeom>
+          <a:ln w="19050">
+            <a:solidFill>
+              <a:srgbClr val="FF0000"/>
+            </a:solidFill>
+            <a:tailEnd type="triangle"/>
+          </a:ln>
+        </p:spPr>
+        <p:style>
+          <a:lnRef idx="1">
+            <a:schemeClr val="accent1"/>
+          </a:lnRef>
+          <a:fillRef idx="0">
+            <a:schemeClr val="accent1"/>
+          </a:fillRef>
+          <a:effectRef idx="0">
+            <a:schemeClr val="accent1"/>
+          </a:effectRef>
+          <a:fontRef idx="minor">
+            <a:schemeClr val="tx1"/>
+          </a:fontRef>
+        </p:style>
+      </p:cxnSp>
+      <p:sp>
+        <p:nvSpPr>
+          <p:cNvPr id="21" name="TextBox 20">
+            <a:extLst>
+              <a:ext uri="{FF2B5EF4-FFF2-40B4-BE49-F238E27FC236}">
+                <a16:creationId xmlns:a16="http://schemas.microsoft.com/office/drawing/2014/main" id="{F23A620D-DBE0-1741-6843-C668FD386814}"/>
+              </a:ext>
+            </a:extLst>
+          </p:cNvPr>
+          <p:cNvSpPr txBox="1"/>
+          <p:nvPr/>
+        </p:nvSpPr>
+        <p:spPr>
+          <a:xfrm>
+            <a:off x="10259901" y="4061144"/>
+            <a:ext cx="1649507" cy="830997"/>
+          </a:xfrm>
+          <a:prstGeom prst="rect">
             <a:avLst/>
           </a:prstGeom>
           <a:noFill/>
-          <a:ln>
-            <a:solidFill>
-              <a:srgbClr val="FF0000"/>
-            </a:solidFill>
-          </a:ln>
-        </p:spPr>
-        <p:style>
-          <a:lnRef idx="2">
-            <a:schemeClr val="accent1">
-              <a:shade val="15000"/>
-            </a:schemeClr>
-          </a:lnRef>
-          <a:fillRef idx="1">
-            <a:schemeClr val="accent1"/>
-          </a:fillRef>
-          <a:effectRef idx="0">
-            <a:schemeClr val="accent1"/>
-          </a:effectRef>
-          <a:fontRef idx="minor">
-            <a:schemeClr val="lt1"/>
-          </a:fontRef>
-        </p:style>
-        <p:txBody>
-          <a:bodyPr rtlCol="0" anchor="ctr"/>
+        </p:spPr>
+        <p:txBody>
+          <a:bodyPr wrap="square" rtlCol="0">
+            <a:spAutoFit/>
+          </a:bodyPr>
           <a:lstStyle/>
           <a:p>
-            <a:pPr algn="ctr"/>
-            <a:r>
-              <a:rPr lang="en-US" dirty="0">
+            <a:r>
+              <a:rPr lang="en-US" sz="1200" dirty="0">
                 <a:solidFill>
                   <a:srgbClr val="FF0000"/>
                 </a:solidFill>
               </a:rPr>
-              <a:t>1</a:t>
-            </a:r>
-          </a:p>
-        </p:txBody>
-      </p:sp>
-      <p:sp>
-        <p:nvSpPr>
-          <p:cNvPr id="22" name="Oval 21">
-            <a:extLst>
-              <a:ext uri="{FF2B5EF4-FFF2-40B4-BE49-F238E27FC236}">
-                <a16:creationId xmlns:a16="http://schemas.microsoft.com/office/drawing/2014/main" id="{2A7B705E-D8B5-72B3-0D93-9C151D04A8AA}"/>
-              </a:ext>
-            </a:extLst>
-          </p:cNvPr>
-          <p:cNvSpPr/>
-          <p:nvPr/>
-        </p:nvSpPr>
-        <p:spPr>
-          <a:xfrm>
-            <a:off x="8274978" y="2004619"/>
-            <a:ext cx="486773" cy="486773"/>
-          </a:xfrm>
-          <a:prstGeom prst="ellipse">
-            <a:avLst/>
-          </a:prstGeom>
-          <a:noFill/>
-          <a:ln>
-            <a:solidFill>
-              <a:srgbClr val="FF0000"/>
-            </a:solidFill>
-          </a:ln>
-        </p:spPr>
-        <p:style>
-          <a:lnRef idx="2">
-            <a:schemeClr val="accent1">
-              <a:shade val="15000"/>
-            </a:schemeClr>
-          </a:lnRef>
-          <a:fillRef idx="1">
-            <a:schemeClr val="accent1"/>
-          </a:fillRef>
-          <a:effectRef idx="0">
-            <a:schemeClr val="accent1"/>
-          </a:effectRef>
-          <a:fontRef idx="minor">
-            <a:schemeClr val="lt1"/>
-          </a:fontRef>
-        </p:style>
-        <p:txBody>
-          <a:bodyPr rtlCol="0" anchor="ctr"/>
-          <a:lstStyle/>
-          <a:p>
-            <a:pPr algn="ctr"/>
-            <a:r>
-              <a:rPr lang="en-US" sz="1100" dirty="0">
+              <a:t>Regex code for ”zero or more spaces at beginning of string”</a:t>
+            </a:r>
+          </a:p>
+          <a:p>
+            <a:r>
+              <a:rPr lang="en-US" sz="1200" dirty="0">
                 <a:solidFill>
                   <a:srgbClr val="FF0000"/>
                 </a:solidFill>
               </a:rPr>
-              <a:t>1a</a:t>
-            </a:r>
-          </a:p>
-        </p:txBody>
-      </p:sp>
-      <p:sp>
-        <p:nvSpPr>
-          <p:cNvPr id="23" name="Oval 22">
-            <a:extLst>
-              <a:ext uri="{FF2B5EF4-FFF2-40B4-BE49-F238E27FC236}">
-                <a16:creationId xmlns:a16="http://schemas.microsoft.com/office/drawing/2014/main" id="{496E7C55-B1E5-2CAF-D1AA-F61C3A7F51BD}"/>
-              </a:ext>
-            </a:extLst>
-          </p:cNvPr>
-          <p:cNvSpPr/>
-          <p:nvPr/>
-        </p:nvSpPr>
-        <p:spPr>
-          <a:xfrm>
-            <a:off x="351980" y="4229203"/>
-            <a:ext cx="352539" cy="352539"/>
-          </a:xfrm>
-          <a:prstGeom prst="ellipse">
-            <a:avLst/>
-          </a:prstGeom>
-          <a:noFill/>
-          <a:ln>
-            <a:solidFill>
-              <a:srgbClr val="FF0000"/>
-            </a:solidFill>
-          </a:ln>
-        </p:spPr>
-        <p:style>
-          <a:lnRef idx="2">
-            <a:schemeClr val="accent1">
-              <a:shade val="15000"/>
-            </a:schemeClr>
-          </a:lnRef>
-          <a:fillRef idx="1">
-            <a:schemeClr val="accent1"/>
-          </a:fillRef>
-          <a:effectRef idx="0">
-            <a:schemeClr val="accent1"/>
-          </a:effectRef>
-          <a:fontRef idx="minor">
-            <a:schemeClr val="lt1"/>
-          </a:fontRef>
-        </p:style>
-        <p:txBody>
-          <a:bodyPr rtlCol="0" anchor="ctr"/>
-          <a:lstStyle/>
-          <a:p>
-            <a:pPr algn="ctr"/>
-            <a:r>
-              <a:rPr lang="en-US" dirty="0">
-                <a:solidFill>
-                  <a:srgbClr val="FF0000"/>
-                </a:solidFill>
-              </a:rPr>
-              <a:t>2</a:t>
-            </a:r>
-          </a:p>
-        </p:txBody>
-      </p:sp>
-      <p:sp>
-        <p:nvSpPr>
-          <p:cNvPr id="24" name="Oval 23">
-            <a:extLst>
-              <a:ext uri="{FF2B5EF4-FFF2-40B4-BE49-F238E27FC236}">
-                <a16:creationId xmlns:a16="http://schemas.microsoft.com/office/drawing/2014/main" id="{2761B248-B261-13A9-F6D4-DEA46A8305C5}"/>
-              </a:ext>
-            </a:extLst>
-          </p:cNvPr>
-          <p:cNvSpPr/>
-          <p:nvPr/>
-        </p:nvSpPr>
-        <p:spPr>
-          <a:xfrm>
-            <a:off x="7888958" y="5239211"/>
-            <a:ext cx="352539" cy="352539"/>
-          </a:xfrm>
-          <a:prstGeom prst="ellipse">
-            <a:avLst/>
-          </a:prstGeom>
-          <a:noFill/>
-          <a:ln>
-            <a:solidFill>
-              <a:srgbClr val="FF0000"/>
-            </a:solidFill>
-          </a:ln>
-        </p:spPr>
-        <p:style>
-          <a:lnRef idx="2">
-            <a:schemeClr val="accent1">
-              <a:shade val="15000"/>
-            </a:schemeClr>
-          </a:lnRef>
-          <a:fillRef idx="1">
-            <a:schemeClr val="accent1"/>
-          </a:fillRef>
-          <a:effectRef idx="0">
-            <a:schemeClr val="accent1"/>
-          </a:effectRef>
-          <a:fontRef idx="minor">
-            <a:schemeClr val="lt1"/>
-          </a:fontRef>
-        </p:style>
-        <p:txBody>
-          <a:bodyPr rtlCol="0" anchor="ctr"/>
-          <a:lstStyle/>
-          <a:p>
-            <a:pPr algn="ctr"/>
-            <a:r>
-              <a:rPr lang="en-US" dirty="0">
-                <a:solidFill>
-                  <a:srgbClr val="FF0000"/>
-                </a:solidFill>
-              </a:rPr>
-              <a:t>3</a:t>
-            </a:r>
-          </a:p>
-        </p:txBody>
-      </p:sp>
-      <p:sp>
-        <p:nvSpPr>
-          <p:cNvPr id="25" name="Rounded Rectangle 24">
-            <a:extLst>
-              <a:ext uri="{FF2B5EF4-FFF2-40B4-BE49-F238E27FC236}">
-                <a16:creationId xmlns:a16="http://schemas.microsoft.com/office/drawing/2014/main" id="{7D854F98-C9C2-0F0D-573C-9AE553745C1C}"/>
-              </a:ext>
-            </a:extLst>
-          </p:cNvPr>
-          <p:cNvSpPr/>
-          <p:nvPr/>
-        </p:nvSpPr>
-        <p:spPr>
-          <a:xfrm>
-            <a:off x="756584" y="4787233"/>
-            <a:ext cx="1168469" cy="274143"/>
-          </a:xfrm>
-          <a:prstGeom prst="roundRect">
-            <a:avLst/>
-          </a:prstGeom>
-          <a:noFill/>
-          <a:ln>
-            <a:solidFill>
-              <a:srgbClr val="FF0000"/>
-            </a:solidFill>
-          </a:ln>
-        </p:spPr>
-        <p:style>
-          <a:lnRef idx="2">
-            <a:schemeClr val="accent1">
-              <a:shade val="15000"/>
-            </a:schemeClr>
-          </a:lnRef>
-          <a:fillRef idx="1">
-            <a:schemeClr val="accent1"/>
-          </a:fillRef>
-          <a:effectRef idx="0">
-            <a:schemeClr val="accent1"/>
-          </a:effectRef>
-          <a:fontRef idx="minor">
-            <a:schemeClr val="lt1"/>
-          </a:fontRef>
-        </p:style>
-        <p:txBody>
-          <a:bodyPr rtlCol="0" anchor="ctr"/>
-          <a:lstStyle/>
-          <a:p>
-            <a:pPr algn="ctr"/>
-            <a:endParaRPr lang="en-US"/>
-          </a:p>
-        </p:txBody>
-      </p:sp>
-      <p:sp>
-        <p:nvSpPr>
-          <p:cNvPr id="26" name="Rounded Rectangle 25">
-            <a:extLst>
-              <a:ext uri="{FF2B5EF4-FFF2-40B4-BE49-F238E27FC236}">
-                <a16:creationId xmlns:a16="http://schemas.microsoft.com/office/drawing/2014/main" id="{96DAD9C6-7F73-4255-5C0A-6E1741E9E760}"/>
-              </a:ext>
-            </a:extLst>
-          </p:cNvPr>
-          <p:cNvSpPr/>
-          <p:nvPr/>
-        </p:nvSpPr>
-        <p:spPr>
-          <a:xfrm>
-            <a:off x="805856" y="3895669"/>
-            <a:ext cx="1311702" cy="274143"/>
-          </a:xfrm>
-          <a:prstGeom prst="roundRect">
-            <a:avLst/>
-          </a:prstGeom>
-          <a:noFill/>
-          <a:ln>
-            <a:solidFill>
-              <a:srgbClr val="FF0000"/>
-            </a:solidFill>
-          </a:ln>
-        </p:spPr>
-        <p:style>
-          <a:lnRef idx="2">
-            <a:schemeClr val="accent1">
-              <a:shade val="15000"/>
-            </a:schemeClr>
-          </a:lnRef>
-          <a:fillRef idx="1">
-            <a:schemeClr val="accent1"/>
-          </a:fillRef>
-          <a:effectRef idx="0">
-            <a:schemeClr val="accent1"/>
-          </a:effectRef>
-          <a:fontRef idx="minor">
-            <a:schemeClr val="lt1"/>
-          </a:fontRef>
-        </p:style>
-        <p:txBody>
-          <a:bodyPr rtlCol="0" anchor="ctr"/>
-          <a:lstStyle/>
-          <a:p>
-            <a:pPr algn="ctr"/>
-            <a:endParaRPr lang="en-US"/>
-          </a:p>
-        </p:txBody>
-      </p:sp>
-      <p:sp>
-        <p:nvSpPr>
-          <p:cNvPr id="27" name="Rounded Rectangle 26">
-            <a:extLst>
-              <a:ext uri="{FF2B5EF4-FFF2-40B4-BE49-F238E27FC236}">
-                <a16:creationId xmlns:a16="http://schemas.microsoft.com/office/drawing/2014/main" id="{EF2FE0F7-B4DE-7400-6E33-E68E1E560A9D}"/>
-              </a:ext>
-            </a:extLst>
-          </p:cNvPr>
-          <p:cNvSpPr/>
-          <p:nvPr/>
-        </p:nvSpPr>
-        <p:spPr>
-          <a:xfrm>
-            <a:off x="3246784" y="2595196"/>
-            <a:ext cx="1022708" cy="278633"/>
-          </a:xfrm>
-          <a:prstGeom prst="roundRect">
-            <a:avLst/>
-          </a:prstGeom>
-          <a:noFill/>
-          <a:ln>
-            <a:solidFill>
-              <a:srgbClr val="FF0000"/>
-            </a:solidFill>
-          </a:ln>
-        </p:spPr>
-        <p:style>
-          <a:lnRef idx="2">
-            <a:schemeClr val="accent1">
-              <a:shade val="15000"/>
-            </a:schemeClr>
-          </a:lnRef>
-          <a:fillRef idx="1">
-            <a:schemeClr val="accent1"/>
-          </a:fillRef>
-          <a:effectRef idx="0">
-            <a:schemeClr val="accent1"/>
-          </a:effectRef>
-          <a:fontRef idx="minor">
-            <a:schemeClr val="lt1"/>
-          </a:fontRef>
-        </p:style>
-        <p:txBody>
-          <a:bodyPr rtlCol="0" anchor="ctr"/>
-          <a:lstStyle/>
-          <a:p>
-            <a:pPr algn="ctr"/>
-            <a:endParaRPr lang="en-US"/>
-          </a:p>
-        </p:txBody>
-      </p:sp>
-      <p:sp>
-        <p:nvSpPr>
-          <p:cNvPr id="28" name="TextBox 27">
-            <a:extLst>
-              <a:ext uri="{FF2B5EF4-FFF2-40B4-BE49-F238E27FC236}">
-                <a16:creationId xmlns:a16="http://schemas.microsoft.com/office/drawing/2014/main" id="{4DB01236-24FF-F59D-1DA2-DCEFDB8D1B99}"/>
-              </a:ext>
-            </a:extLst>
-          </p:cNvPr>
-          <p:cNvSpPr txBox="1"/>
-          <p:nvPr/>
-        </p:nvSpPr>
-        <p:spPr>
-          <a:xfrm>
-            <a:off x="3884774" y="5851997"/>
-            <a:ext cx="4457152" cy="523220"/>
-          </a:xfrm>
-          <a:prstGeom prst="rect">
-            <a:avLst/>
-          </a:prstGeom>
-          <a:noFill/>
-        </p:spPr>
-        <p:txBody>
-          <a:bodyPr wrap="square" rtlCol="0">
-            <a:spAutoFit/>
-          </a:bodyPr>
-          <a:lstStyle/>
-          <a:p>
-            <a:r>
-              <a:rPr lang="en-US" sz="1400" dirty="0">
-                <a:solidFill>
-                  <a:srgbClr val="FF0000"/>
-                </a:solidFill>
-              </a:rPr>
-              <a:t>Anaconda selects related (aka “dependent”) packages needed by the selected package</a:t>
-            </a:r>
-          </a:p>
-        </p:txBody>
-      </p:sp>
-      <p:sp>
-        <p:nvSpPr>
-          <p:cNvPr id="29" name="TextBox 28">
-            <a:extLst>
-              <a:ext uri="{FF2B5EF4-FFF2-40B4-BE49-F238E27FC236}">
-                <a16:creationId xmlns:a16="http://schemas.microsoft.com/office/drawing/2014/main" id="{AC4062EC-6534-CB09-A973-7BF4852CDD0F}"/>
-              </a:ext>
-            </a:extLst>
-          </p:cNvPr>
-          <p:cNvSpPr txBox="1"/>
-          <p:nvPr/>
-        </p:nvSpPr>
-        <p:spPr>
-          <a:xfrm>
-            <a:off x="3342528" y="3307209"/>
-            <a:ext cx="4999398" cy="307777"/>
-          </a:xfrm>
-          <a:prstGeom prst="rect">
-            <a:avLst/>
-          </a:prstGeom>
-          <a:noFill/>
-        </p:spPr>
-        <p:txBody>
-          <a:bodyPr wrap="square" rtlCol="0">
-            <a:spAutoFit/>
-          </a:bodyPr>
-          <a:lstStyle/>
-          <a:p>
-            <a:r>
-              <a:rPr lang="en-US" sz="1400" dirty="0">
-                <a:solidFill>
-                  <a:srgbClr val="FF0000"/>
-                </a:solidFill>
-              </a:rPr>
-              <a:t>** regex is not Installed in environment named “Latest” **</a:t>
+              <a:t>(“ChatGPT pls help!!”)</a:t>
             </a:r>
           </a:p>
         </p:txBody>
@@ -8945,7 +9264,7 @@
     </p:spTree>
     <p:extLst>
       <p:ext uri="{BB962C8B-B14F-4D97-AF65-F5344CB8AC3E}">
-        <p14:creationId xmlns:p14="http://schemas.microsoft.com/office/powerpoint/2010/main" val="3457585315"/>
+        <p14:creationId xmlns:p14="http://schemas.microsoft.com/office/powerpoint/2010/main" val="556289795"/>
       </p:ext>
     </p:extLst>
   </p:cSld>
@@ -8958,14 +9277,6 @@
 <file path=ppt/slides/slide8.xml><?xml version="1.0" encoding="utf-8"?>
 <p:sld xmlns:a="http://schemas.openxmlformats.org/drawingml/2006/main" xmlns:r="http://schemas.openxmlformats.org/officeDocument/2006/relationships" xmlns:p="http://schemas.openxmlformats.org/presentationml/2006/main">
   <p:cSld>
-    <p:bg>
-      <p:bgPr>
-        <a:solidFill>
-          <a:schemeClr val="bg1"/>
-        </a:solidFill>
-        <a:effectLst/>
-      </p:bgPr>
-    </p:bg>
     <p:spTree>
       <p:nvGrpSpPr>
         <p:cNvPr id="1" name=""/>
@@ -8982,51 +9293,250 @@
       </p:grpSpPr>
       <p:sp>
         <p:nvSpPr>
-          <p:cNvPr id="12" name="Rectangle 11">
+          <p:cNvPr id="2" name="Title 1">
             <a:extLst>
               <a:ext uri="{FF2B5EF4-FFF2-40B4-BE49-F238E27FC236}">
-                <a16:creationId xmlns:a16="http://schemas.microsoft.com/office/drawing/2014/main" id="{E6C8E6EB-4C59-429B-97E4-72A058CFC4FB}"/>
-              </a:ext>
-              <a:ext uri="{C183D7F6-B498-43B3-948B-1728B52AA6E4}">
-                <adec:decorative xmlns:adec="http://schemas.microsoft.com/office/drawing/2017/decorative" val="1"/>
+                <a16:creationId xmlns:a16="http://schemas.microsoft.com/office/drawing/2014/main" id="{42F68283-4139-528C-B5F3-7137F0FD7346}"/>
               </a:ext>
             </a:extLst>
           </p:cNvPr>
           <p:cNvSpPr>
-            <a:spLocks noGrp="1" noRot="1" noChangeAspect="1" noMove="1" noResize="1" noEditPoints="1" noAdjustHandles="1" noChangeArrowheads="1" noChangeShapeType="1" noTextEdit="1"/>
-          </p:cNvSpPr>
-          <p:nvPr>
-            <p:extLst>
-              <p:ext uri="{386F3935-93C4-4BCD-93E2-E3B085C9AB24}">
-                <p16:designElem xmlns:p16="http://schemas.microsoft.com/office/powerpoint/2015/main" val="1"/>
-              </p:ext>
-            </p:extLst>
-          </p:nvPr>
-        </p:nvSpPr>
-        <p:spPr>
-          <a:xfrm>
-            <a:off x="446534" y="457200"/>
-            <a:ext cx="3703320" cy="94997"/>
+            <a:spLocks noGrp="1"/>
+          </p:cNvSpPr>
+          <p:nvPr>
+            <p:ph type="title"/>
+          </p:nvPr>
+        </p:nvSpPr>
+        <p:spPr/>
+        <p:txBody>
+          <a:bodyPr/>
+          <a:lstStyle/>
+          <a:p>
+            <a:r>
+              <a:rPr lang="en-US" dirty="0"/>
+              <a:t>Installing Packages (AKA Libraries) In Anaconda</a:t>
+            </a:r>
+          </a:p>
+        </p:txBody>
+      </p:sp>
+      <p:sp>
+        <p:nvSpPr>
+          <p:cNvPr id="5" name="Content Placeholder 4">
+            <a:extLst>
+              <a:ext uri="{FF2B5EF4-FFF2-40B4-BE49-F238E27FC236}">
+                <a16:creationId xmlns:a16="http://schemas.microsoft.com/office/drawing/2014/main" id="{4C68EE47-C7F7-3771-24E8-E631727F9070}"/>
+              </a:ext>
+            </a:extLst>
+          </p:cNvPr>
+          <p:cNvSpPr>
+            <a:spLocks noGrp="1"/>
+          </p:cNvSpPr>
+          <p:nvPr>
+            <p:ph idx="1"/>
+          </p:nvPr>
+        </p:nvSpPr>
+        <p:spPr/>
+        <p:txBody>
+          <a:bodyPr>
+            <a:normAutofit/>
+          </a:bodyPr>
+          <a:lstStyle/>
+          <a:p>
+            <a:pPr marL="0" indent="0">
+              <a:buNone/>
+            </a:pPr>
+            <a:r>
+              <a:rPr lang="en-US" u="sng" dirty="0"/>
+              <a:t>=</a:t>
+            </a:r>
+            <a:endParaRPr lang="en-US" dirty="0"/>
+          </a:p>
+          <a:p>
+            <a:endParaRPr lang="en-US" dirty="0"/>
+          </a:p>
+        </p:txBody>
+      </p:sp>
+      <p:pic>
+        <p:nvPicPr>
+          <p:cNvPr id="9" name="Picture 8" descr="A screenshot of a computer&#10;&#10;Description automatically generated">
+            <a:extLst>
+              <a:ext uri="{FF2B5EF4-FFF2-40B4-BE49-F238E27FC236}">
+                <a16:creationId xmlns:a16="http://schemas.microsoft.com/office/drawing/2014/main" id="{11A4757E-E86F-31E2-4B0C-8EE3F9DD708B}"/>
+              </a:ext>
+            </a:extLst>
+          </p:cNvPr>
+          <p:cNvPicPr>
+            <a:picLocks noChangeAspect="1"/>
+          </p:cNvPicPr>
+          <p:nvPr/>
+        </p:nvPicPr>
+        <p:blipFill>
+          <a:blip r:embed="rId2">
+            <a:extLst>
+              <a:ext uri="{28A0092B-C50C-407E-A947-70E740481C1C}">
+                <a14:useLocalDpi xmlns:a14="http://schemas.microsoft.com/office/drawing/2010/main" val="0"/>
+              </a:ext>
+            </a:extLst>
+          </a:blip>
+          <a:stretch>
+            <a:fillRect/>
+          </a:stretch>
+        </p:blipFill>
+        <p:spPr>
+          <a:xfrm>
+            <a:off x="304494" y="2016199"/>
+            <a:ext cx="7772400" cy="1595918"/>
           </a:xfrm>
           <a:prstGeom prst="rect">
             <a:avLst/>
           </a:prstGeom>
-          <a:solidFill>
-            <a:srgbClr val="465359"/>
-          </a:solidFill>
+        </p:spPr>
+      </p:pic>
+      <p:pic>
+        <p:nvPicPr>
+          <p:cNvPr id="13" name="Picture 12" descr="A screenshot of a chat&#10;&#10;Description automatically generated">
+            <a:extLst>
+              <a:ext uri="{FF2B5EF4-FFF2-40B4-BE49-F238E27FC236}">
+                <a16:creationId xmlns:a16="http://schemas.microsoft.com/office/drawing/2014/main" id="{84FEC610-6940-969C-4790-A917154A9A01}"/>
+              </a:ext>
+            </a:extLst>
+          </p:cNvPr>
+          <p:cNvPicPr>
+            <a:picLocks noChangeAspect="1"/>
+          </p:cNvPicPr>
+          <p:nvPr/>
+        </p:nvPicPr>
+        <p:blipFill>
+          <a:blip r:embed="rId3">
+            <a:extLst>
+              <a:ext uri="{28A0092B-C50C-407E-A947-70E740481C1C}">
+                <a14:useLocalDpi xmlns:a14="http://schemas.microsoft.com/office/drawing/2010/main" val="0"/>
+              </a:ext>
+            </a:extLst>
+          </a:blip>
+          <a:stretch>
+            <a:fillRect/>
+          </a:stretch>
+        </p:blipFill>
+        <p:spPr>
+          <a:xfrm>
+            <a:off x="735707" y="3818438"/>
+            <a:ext cx="6459632" cy="1457172"/>
+          </a:xfrm>
+          <a:prstGeom prst="rect">
+            <a:avLst/>
+          </a:prstGeom>
+        </p:spPr>
+      </p:pic>
+      <p:pic>
+        <p:nvPicPr>
+          <p:cNvPr id="16" name="Picture 15" descr="A screenshot of a package&#10;&#10;Description automatically generated">
+            <a:extLst>
+              <a:ext uri="{FF2B5EF4-FFF2-40B4-BE49-F238E27FC236}">
+                <a16:creationId xmlns:a16="http://schemas.microsoft.com/office/drawing/2014/main" id="{0C601E31-1C82-84A2-304F-8741B4E9E9BE}"/>
+              </a:ext>
+            </a:extLst>
+          </p:cNvPr>
+          <p:cNvPicPr>
+            <a:picLocks noChangeAspect="1"/>
+          </p:cNvPicPr>
+          <p:nvPr/>
+        </p:nvPicPr>
+        <p:blipFill>
+          <a:blip r:embed="rId4">
+            <a:extLst>
+              <a:ext uri="{28A0092B-C50C-407E-A947-70E740481C1C}">
+                <a14:useLocalDpi xmlns:a14="http://schemas.microsoft.com/office/drawing/2010/main" val="0"/>
+              </a:ext>
+            </a:extLst>
+          </a:blip>
+          <a:stretch>
+            <a:fillRect/>
+          </a:stretch>
+        </p:blipFill>
+        <p:spPr>
+          <a:xfrm>
+            <a:off x="8341926" y="3948362"/>
+            <a:ext cx="2959780" cy="2430135"/>
+          </a:xfrm>
+          <a:prstGeom prst="rect">
+            <a:avLst/>
+          </a:prstGeom>
+        </p:spPr>
+      </p:pic>
+      <p:pic>
+        <p:nvPicPr>
+          <p:cNvPr id="20" name="Picture 19" descr="A screenshot of a computer&#10;&#10;Description automatically generated">
+            <a:extLst>
+              <a:ext uri="{FF2B5EF4-FFF2-40B4-BE49-F238E27FC236}">
+                <a16:creationId xmlns:a16="http://schemas.microsoft.com/office/drawing/2014/main" id="{45CC4F3C-7B49-B042-B681-3A3099DFEFB0}"/>
+              </a:ext>
+            </a:extLst>
+          </p:cNvPr>
+          <p:cNvPicPr>
+            <a:picLocks noChangeAspect="1"/>
+          </p:cNvPicPr>
+          <p:nvPr/>
+        </p:nvPicPr>
+        <p:blipFill>
+          <a:blip r:embed="rId5">
+            <a:extLst>
+              <a:ext uri="{28A0092B-C50C-407E-A947-70E740481C1C}">
+                <a14:useLocalDpi xmlns:a14="http://schemas.microsoft.com/office/drawing/2010/main" val="0"/>
+              </a:ext>
+            </a:extLst>
+          </a:blip>
+          <a:stretch>
+            <a:fillRect/>
+          </a:stretch>
+        </p:blipFill>
+        <p:spPr>
+          <a:xfrm>
+            <a:off x="8128959" y="2416293"/>
+            <a:ext cx="3758546" cy="1132445"/>
+          </a:xfrm>
+          <a:prstGeom prst="rect">
+            <a:avLst/>
+          </a:prstGeom>
+        </p:spPr>
+      </p:pic>
+      <p:sp>
+        <p:nvSpPr>
+          <p:cNvPr id="21" name="Oval 20">
+            <a:extLst>
+              <a:ext uri="{FF2B5EF4-FFF2-40B4-BE49-F238E27FC236}">
+                <a16:creationId xmlns:a16="http://schemas.microsoft.com/office/drawing/2014/main" id="{F58594C9-543D-03D5-5D8D-D5FECE1F063C}"/>
+              </a:ext>
+            </a:extLst>
+          </p:cNvPr>
+          <p:cNvSpPr/>
+          <p:nvPr/>
+        </p:nvSpPr>
+        <p:spPr>
+          <a:xfrm>
+            <a:off x="870331" y="1994962"/>
+            <a:ext cx="352539" cy="352539"/>
+          </a:xfrm>
+          <a:prstGeom prst="ellipse">
+            <a:avLst/>
+          </a:prstGeom>
+          <a:noFill/>
           <a:ln>
-            <a:noFill/>
+            <a:solidFill>
+              <a:srgbClr val="FF0000"/>
+            </a:solidFill>
           </a:ln>
-          <a:effectLst/>
         </p:spPr>
         <p:style>
-          <a:lnRef idx="1">
-            <a:schemeClr val="accent1"/>
+          <a:lnRef idx="2">
+            <a:schemeClr val="accent1">
+              <a:shade val="15000"/>
+            </a:schemeClr>
           </a:lnRef>
-          <a:fillRef idx="3">
+          <a:fillRef idx="1">
             <a:schemeClr val="accent1"/>
           </a:fillRef>
-          <a:effectRef idx="2">
+          <a:effectRef idx="0">
             <a:schemeClr val="accent1"/>
           </a:effectRef>
           <a:fontRef idx="minor">
@@ -9034,60 +9544,58 @@
           </a:fontRef>
         </p:style>
         <p:txBody>
-          <a:bodyPr/>
+          <a:bodyPr rtlCol="0" anchor="ctr"/>
           <a:lstStyle/>
           <a:p>
-            <a:endParaRPr lang="en-US"/>
-          </a:p>
-        </p:txBody>
-      </p:sp>
-      <p:sp>
-        <p:nvSpPr>
-          <p:cNvPr id="14" name="Rectangle 13">
+            <a:pPr algn="ctr"/>
+            <a:r>
+              <a:rPr lang="en-US" dirty="0">
+                <a:solidFill>
+                  <a:srgbClr val="FF0000"/>
+                </a:solidFill>
+              </a:rPr>
+              <a:t>1</a:t>
+            </a:r>
+          </a:p>
+        </p:txBody>
+      </p:sp>
+      <p:sp>
+        <p:nvSpPr>
+          <p:cNvPr id="22" name="Oval 21">
             <a:extLst>
               <a:ext uri="{FF2B5EF4-FFF2-40B4-BE49-F238E27FC236}">
-                <a16:creationId xmlns:a16="http://schemas.microsoft.com/office/drawing/2014/main" id="{B5B90362-AFCC-46A9-B41C-A257A8C5B314}"/>
-              </a:ext>
-              <a:ext uri="{C183D7F6-B498-43B3-948B-1728B52AA6E4}">
-                <adec:decorative xmlns:adec="http://schemas.microsoft.com/office/drawing/2017/decorative" val="1"/>
+                <a16:creationId xmlns:a16="http://schemas.microsoft.com/office/drawing/2014/main" id="{2A7B705E-D8B5-72B3-0D93-9C151D04A8AA}"/>
               </a:ext>
             </a:extLst>
           </p:cNvPr>
-          <p:cNvSpPr>
-            <a:spLocks noGrp="1" noRot="1" noChangeAspect="1" noMove="1" noResize="1" noEditPoints="1" noAdjustHandles="1" noChangeArrowheads="1" noChangeShapeType="1" noTextEdit="1"/>
-          </p:cNvSpPr>
-          <p:nvPr>
-            <p:extLst>
-              <p:ext uri="{386F3935-93C4-4BCD-93E2-E3B085C9AB24}">
-                <p16:designElem xmlns:p16="http://schemas.microsoft.com/office/powerpoint/2015/main" val="1"/>
-              </p:ext>
-            </p:extLst>
-          </p:nvPr>
-        </p:nvSpPr>
-        <p:spPr>
-          <a:xfrm>
-            <a:off x="8042147" y="453643"/>
-            <a:ext cx="3703320" cy="98554"/>
-          </a:xfrm>
-          <a:prstGeom prst="rect">
+          <p:cNvSpPr/>
+          <p:nvPr/>
+        </p:nvSpPr>
+        <p:spPr>
+          <a:xfrm>
+            <a:off x="8274978" y="2004619"/>
+            <a:ext cx="486773" cy="486773"/>
+          </a:xfrm>
+          <a:prstGeom prst="ellipse">
             <a:avLst/>
           </a:prstGeom>
-          <a:solidFill>
-            <a:srgbClr val="969FA7"/>
-          </a:solidFill>
+          <a:noFill/>
           <a:ln>
-            <a:noFill/>
+            <a:solidFill>
+              <a:srgbClr val="FF0000"/>
+            </a:solidFill>
           </a:ln>
-          <a:effectLst/>
         </p:spPr>
         <p:style>
-          <a:lnRef idx="1">
-            <a:schemeClr val="accent1"/>
+          <a:lnRef idx="2">
+            <a:schemeClr val="accent1">
+              <a:shade val="15000"/>
+            </a:schemeClr>
           </a:lnRef>
-          <a:fillRef idx="3">
+          <a:fillRef idx="1">
             <a:schemeClr val="accent1"/>
           </a:fillRef>
-          <a:effectRef idx="2">
+          <a:effectRef idx="0">
             <a:schemeClr val="accent1"/>
           </a:effectRef>
           <a:fontRef idx="minor">
@@ -9095,60 +9603,58 @@
           </a:fontRef>
         </p:style>
         <p:txBody>
-          <a:bodyPr/>
+          <a:bodyPr rtlCol="0" anchor="ctr"/>
           <a:lstStyle/>
           <a:p>
-            <a:endParaRPr lang="en-US"/>
-          </a:p>
-        </p:txBody>
-      </p:sp>
-      <p:sp>
-        <p:nvSpPr>
-          <p:cNvPr id="16" name="Rectangle 15">
+            <a:pPr algn="ctr"/>
+            <a:r>
+              <a:rPr lang="en-US" sz="1100" dirty="0">
+                <a:solidFill>
+                  <a:srgbClr val="FF0000"/>
+                </a:solidFill>
+              </a:rPr>
+              <a:t>1a</a:t>
+            </a:r>
+          </a:p>
+        </p:txBody>
+      </p:sp>
+      <p:sp>
+        <p:nvSpPr>
+          <p:cNvPr id="23" name="Oval 22">
             <a:extLst>
               <a:ext uri="{FF2B5EF4-FFF2-40B4-BE49-F238E27FC236}">
-                <a16:creationId xmlns:a16="http://schemas.microsoft.com/office/drawing/2014/main" id="{F71EF7F1-38BA-471D-8CD4-2A9AE8E35527}"/>
-              </a:ext>
-              <a:ext uri="{C183D7F6-B498-43B3-948B-1728B52AA6E4}">
-                <adec:decorative xmlns:adec="http://schemas.microsoft.com/office/drawing/2017/decorative" val="1"/>
+                <a16:creationId xmlns:a16="http://schemas.microsoft.com/office/drawing/2014/main" id="{496E7C55-B1E5-2CAF-D1AA-F61C3A7F51BD}"/>
               </a:ext>
             </a:extLst>
           </p:cNvPr>
-          <p:cNvSpPr>
-            <a:spLocks noGrp="1" noRot="1" noChangeAspect="1" noMove="1" noResize="1" noEditPoints="1" noAdjustHandles="1" noChangeArrowheads="1" noChangeShapeType="1" noTextEdit="1"/>
-          </p:cNvSpPr>
-          <p:nvPr>
-            <p:extLst>
-              <p:ext uri="{386F3935-93C4-4BCD-93E2-E3B085C9AB24}">
-                <p16:designElem xmlns:p16="http://schemas.microsoft.com/office/powerpoint/2015/main" val="1"/>
-              </p:ext>
-            </p:extLst>
-          </p:nvPr>
-        </p:nvSpPr>
-        <p:spPr>
-          <a:xfrm>
-            <a:off x="4241830" y="457200"/>
-            <a:ext cx="3703320" cy="91440"/>
-          </a:xfrm>
-          <a:prstGeom prst="rect">
+          <p:cNvSpPr/>
+          <p:nvPr/>
+        </p:nvSpPr>
+        <p:spPr>
+          <a:xfrm>
+            <a:off x="351980" y="4229203"/>
+            <a:ext cx="352539" cy="352539"/>
+          </a:xfrm>
+          <a:prstGeom prst="ellipse">
             <a:avLst/>
           </a:prstGeom>
-          <a:solidFill>
-            <a:schemeClr val="accent1"/>
-          </a:solidFill>
+          <a:noFill/>
           <a:ln>
-            <a:noFill/>
+            <a:solidFill>
+              <a:srgbClr val="FF0000"/>
+            </a:solidFill>
           </a:ln>
-          <a:effectLst/>
         </p:spPr>
         <p:style>
-          <a:lnRef idx="1">
-            <a:schemeClr val="accent1"/>
+          <a:lnRef idx="2">
+            <a:schemeClr val="accent1">
+              <a:shade val="15000"/>
+            </a:schemeClr>
           </a:lnRef>
-          <a:fillRef idx="3">
+          <a:fillRef idx="1">
             <a:schemeClr val="accent1"/>
           </a:fillRef>
-          <a:effectRef idx="2">
+          <a:effectRef idx="0">
             <a:schemeClr val="accent1"/>
           </a:effectRef>
           <a:fontRef idx="minor">
@@ -9156,52 +9662,52 @@
           </a:fontRef>
         </p:style>
         <p:txBody>
-          <a:bodyPr/>
+          <a:bodyPr rtlCol="0" anchor="ctr"/>
           <a:lstStyle/>
           <a:p>
-            <a:endParaRPr lang="en-US"/>
-          </a:p>
-        </p:txBody>
-      </p:sp>
-      <p:sp useBgFill="1">
-        <p:nvSpPr>
-          <p:cNvPr id="18" name="Rectangle 17">
+            <a:pPr algn="ctr"/>
+            <a:r>
+              <a:rPr lang="en-US" dirty="0">
+                <a:solidFill>
+                  <a:srgbClr val="FF0000"/>
+                </a:solidFill>
+              </a:rPr>
+              <a:t>2</a:t>
+            </a:r>
+          </a:p>
+        </p:txBody>
+      </p:sp>
+      <p:sp>
+        <p:nvSpPr>
+          <p:cNvPr id="24" name="Oval 23">
             <a:extLst>
               <a:ext uri="{FF2B5EF4-FFF2-40B4-BE49-F238E27FC236}">
-                <a16:creationId xmlns:a16="http://schemas.microsoft.com/office/drawing/2014/main" id="{1BB56EB9-078F-4952-AC1F-149C7A0AE4D5}"/>
-              </a:ext>
-              <a:ext uri="{C183D7F6-B498-43B3-948B-1728B52AA6E4}">
-                <adec:decorative xmlns:adec="http://schemas.microsoft.com/office/drawing/2017/decorative" val="1"/>
+                <a16:creationId xmlns:a16="http://schemas.microsoft.com/office/drawing/2014/main" id="{2761B248-B261-13A9-F6D4-DEA46A8305C5}"/>
               </a:ext>
             </a:extLst>
           </p:cNvPr>
-          <p:cNvSpPr>
-            <a:spLocks noGrp="1" noRot="1" noChangeAspect="1" noMove="1" noResize="1" noEditPoints="1" noAdjustHandles="1" noChangeArrowheads="1" noChangeShapeType="1" noTextEdit="1"/>
-          </p:cNvSpPr>
-          <p:nvPr>
-            <p:extLst>
-              <p:ext uri="{386F3935-93C4-4BCD-93E2-E3B085C9AB24}">
-                <p16:designElem xmlns:p16="http://schemas.microsoft.com/office/powerpoint/2015/main" val="1"/>
-              </p:ext>
-            </p:extLst>
-          </p:nvPr>
-        </p:nvSpPr>
-        <p:spPr>
-          <a:xfrm>
-            <a:off x="0" y="0"/>
-            <a:ext cx="12192000" cy="6858000"/>
-          </a:xfrm>
-          <a:prstGeom prst="rect">
+          <p:cNvSpPr/>
+          <p:nvPr/>
+        </p:nvSpPr>
+        <p:spPr>
+          <a:xfrm>
+            <a:off x="7888958" y="5239211"/>
+            <a:ext cx="352539" cy="352539"/>
+          </a:xfrm>
+          <a:prstGeom prst="ellipse">
             <a:avLst/>
           </a:prstGeom>
+          <a:noFill/>
           <a:ln>
-            <a:noFill/>
+            <a:solidFill>
+              <a:srgbClr val="FF0000"/>
+            </a:solidFill>
           </a:ln>
         </p:spPr>
         <p:style>
           <a:lnRef idx="2">
             <a:schemeClr val="accent1">
-              <a:shade val="50000"/>
+              <a:shade val="15000"/>
             </a:schemeClr>
           </a:lnRef>
           <a:fillRef idx="1">
@@ -9219,99 +9725,54 @@
           <a:lstStyle/>
           <a:p>
             <a:pPr algn="ctr"/>
-            <a:endParaRPr lang="en-US"/>
-          </a:p>
-        </p:txBody>
-      </p:sp>
-      <p:sp>
-        <p:nvSpPr>
-          <p:cNvPr id="2" name="Title 1">
+            <a:r>
+              <a:rPr lang="en-US" dirty="0">
+                <a:solidFill>
+                  <a:srgbClr val="FF0000"/>
+                </a:solidFill>
+              </a:rPr>
+              <a:t>3</a:t>
+            </a:r>
+          </a:p>
+        </p:txBody>
+      </p:sp>
+      <p:sp>
+        <p:nvSpPr>
+          <p:cNvPr id="25" name="Rounded Rectangle 24">
             <a:extLst>
               <a:ext uri="{FF2B5EF4-FFF2-40B4-BE49-F238E27FC236}">
-                <a16:creationId xmlns:a16="http://schemas.microsoft.com/office/drawing/2014/main" id="{54EE378A-F88D-4129-A984-BE9F8C7B2BC5}"/>
+                <a16:creationId xmlns:a16="http://schemas.microsoft.com/office/drawing/2014/main" id="{7D854F98-C9C2-0F0D-573C-9AE553745C1C}"/>
               </a:ext>
             </a:extLst>
           </p:cNvPr>
-          <p:cNvSpPr>
-            <a:spLocks noGrp="1"/>
-          </p:cNvSpPr>
-          <p:nvPr>
-            <p:ph type="title"/>
-          </p:nvPr>
-        </p:nvSpPr>
-        <p:spPr>
-          <a:xfrm>
-            <a:off x="4382724" y="702156"/>
-            <a:ext cx="7225075" cy="1013800"/>
-          </a:xfrm>
-        </p:spPr>
-        <p:txBody>
-          <a:bodyPr vert="horz" lIns="91440" tIns="45720" rIns="91440" bIns="45720" rtlCol="0" anchor="b">
-            <a:normAutofit/>
-          </a:bodyPr>
-          <a:lstStyle/>
-          <a:p>
-            <a:r>
-              <a:rPr lang="en-US" b="0" kern="1200" cap="all" dirty="0">
-                <a:solidFill>
-                  <a:schemeClr val="tx2"/>
-                </a:solidFill>
-                <a:latin typeface="+mj-lt"/>
-                <a:ea typeface="+mj-ea"/>
-                <a:cs typeface="+mj-cs"/>
-              </a:rPr>
-              <a:t>Objectives</a:t>
-            </a:r>
-          </a:p>
-        </p:txBody>
-      </p:sp>
-      <p:sp>
-        <p:nvSpPr>
-          <p:cNvPr id="20" name="Rectangle 19">
-            <a:extLst>
-              <a:ext uri="{FF2B5EF4-FFF2-40B4-BE49-F238E27FC236}">
-                <a16:creationId xmlns:a16="http://schemas.microsoft.com/office/drawing/2014/main" id="{10058680-D07C-4893-B2B7-91543F18AB32}"/>
-              </a:ext>
-              <a:ext uri="{C183D7F6-B498-43B3-948B-1728B52AA6E4}">
-                <adec:decorative xmlns:adec="http://schemas.microsoft.com/office/drawing/2017/decorative" val="1"/>
-              </a:ext>
-            </a:extLst>
-          </p:cNvPr>
-          <p:cNvSpPr>
-            <a:spLocks noGrp="1" noRot="1" noChangeAspect="1" noMove="1" noResize="1" noEditPoints="1" noAdjustHandles="1" noChangeArrowheads="1" noChangeShapeType="1" noTextEdit="1"/>
-          </p:cNvSpPr>
-          <p:nvPr>
-            <p:extLst>
-              <p:ext uri="{386F3935-93C4-4BCD-93E2-E3B085C9AB24}">
-                <p16:designElem xmlns:p16="http://schemas.microsoft.com/office/powerpoint/2015/main" val="1"/>
-              </p:ext>
-            </p:extLst>
-          </p:nvPr>
-        </p:nvSpPr>
-        <p:spPr>
-          <a:xfrm>
-            <a:off x="446534" y="472603"/>
-            <a:ext cx="3703320" cy="94997"/>
-          </a:xfrm>
-          <a:prstGeom prst="rect">
+          <p:cNvSpPr/>
+          <p:nvPr/>
+        </p:nvSpPr>
+        <p:spPr>
+          <a:xfrm>
+            <a:off x="756584" y="4787233"/>
+            <a:ext cx="1168469" cy="274143"/>
+          </a:xfrm>
+          <a:prstGeom prst="roundRect">
             <a:avLst/>
           </a:prstGeom>
-          <a:solidFill>
-            <a:srgbClr val="465359"/>
-          </a:solidFill>
+          <a:noFill/>
           <a:ln>
-            <a:noFill/>
+            <a:solidFill>
+              <a:srgbClr val="FF0000"/>
+            </a:solidFill>
           </a:ln>
-          <a:effectLst/>
         </p:spPr>
         <p:style>
-          <a:lnRef idx="1">
-            <a:schemeClr val="accent1"/>
+          <a:lnRef idx="2">
+            <a:schemeClr val="accent1">
+              <a:shade val="15000"/>
+            </a:schemeClr>
           </a:lnRef>
-          <a:fillRef idx="3">
+          <a:fillRef idx="1">
             <a:schemeClr val="accent1"/>
           </a:fillRef>
-          <a:effectRef idx="2">
+          <a:effectRef idx="0">
             <a:schemeClr val="accent1"/>
           </a:effectRef>
           <a:fontRef idx="minor">
@@ -9319,60 +9780,51 @@
           </a:fontRef>
         </p:style>
         <p:txBody>
-          <a:bodyPr/>
+          <a:bodyPr rtlCol="0" anchor="ctr"/>
           <a:lstStyle/>
           <a:p>
+            <a:pPr algn="ctr"/>
             <a:endParaRPr lang="en-US"/>
           </a:p>
         </p:txBody>
       </p:sp>
       <p:sp>
         <p:nvSpPr>
-          <p:cNvPr id="22" name="Rectangle 21">
+          <p:cNvPr id="26" name="Rounded Rectangle 25">
             <a:extLst>
               <a:ext uri="{FF2B5EF4-FFF2-40B4-BE49-F238E27FC236}">
-                <a16:creationId xmlns:a16="http://schemas.microsoft.com/office/drawing/2014/main" id="{7B42427A-0A1F-4A55-8705-D9179F1E0CFB}"/>
-              </a:ext>
-              <a:ext uri="{C183D7F6-B498-43B3-948B-1728B52AA6E4}">
-                <adec:decorative xmlns:adec="http://schemas.microsoft.com/office/drawing/2017/decorative" val="1"/>
+                <a16:creationId xmlns:a16="http://schemas.microsoft.com/office/drawing/2014/main" id="{96DAD9C6-7F73-4255-5C0A-6E1741E9E760}"/>
               </a:ext>
             </a:extLst>
           </p:cNvPr>
-          <p:cNvSpPr>
-            <a:spLocks noGrp="1" noRot="1" noChangeAspect="1" noMove="1" noResize="1" noEditPoints="1" noAdjustHandles="1" noChangeArrowheads="1" noChangeShapeType="1" noTextEdit="1"/>
-          </p:cNvSpPr>
-          <p:nvPr>
-            <p:extLst>
-              <p:ext uri="{386F3935-93C4-4BCD-93E2-E3B085C9AB24}">
-                <p16:designElem xmlns:p16="http://schemas.microsoft.com/office/powerpoint/2015/main" val="1"/>
-              </p:ext>
-            </p:extLst>
-          </p:nvPr>
-        </p:nvSpPr>
-        <p:spPr>
-          <a:xfrm>
-            <a:off x="4241830" y="457200"/>
-            <a:ext cx="3703320" cy="91440"/>
-          </a:xfrm>
-          <a:prstGeom prst="rect">
+          <p:cNvSpPr/>
+          <p:nvPr/>
+        </p:nvSpPr>
+        <p:spPr>
+          <a:xfrm>
+            <a:off x="805856" y="3895669"/>
+            <a:ext cx="1311702" cy="274143"/>
+          </a:xfrm>
+          <a:prstGeom prst="roundRect">
             <a:avLst/>
           </a:prstGeom>
-          <a:solidFill>
-            <a:schemeClr val="accent1"/>
-          </a:solidFill>
+          <a:noFill/>
           <a:ln>
-            <a:noFill/>
+            <a:solidFill>
+              <a:srgbClr val="FF0000"/>
+            </a:solidFill>
           </a:ln>
-          <a:effectLst/>
         </p:spPr>
         <p:style>
-          <a:lnRef idx="1">
-            <a:schemeClr val="accent1"/>
+          <a:lnRef idx="2">
+            <a:schemeClr val="accent1">
+              <a:shade val="15000"/>
+            </a:schemeClr>
           </a:lnRef>
-          <a:fillRef idx="3">
+          <a:fillRef idx="1">
             <a:schemeClr val="accent1"/>
           </a:fillRef>
-          <a:effectRef idx="2">
+          <a:effectRef idx="0">
             <a:schemeClr val="accent1"/>
           </a:effectRef>
           <a:fontRef idx="minor">
@@ -9380,60 +9832,51 @@
           </a:fontRef>
         </p:style>
         <p:txBody>
-          <a:bodyPr/>
+          <a:bodyPr rtlCol="0" anchor="ctr"/>
           <a:lstStyle/>
           <a:p>
-            <a:endParaRPr lang="en-US" dirty="0"/>
-          </a:p>
-        </p:txBody>
-      </p:sp>
-      <p:sp>
-        <p:nvSpPr>
-          <p:cNvPr id="24" name="Rectangle 23">
+            <a:pPr algn="ctr"/>
+            <a:endParaRPr lang="en-US"/>
+          </a:p>
+        </p:txBody>
+      </p:sp>
+      <p:sp>
+        <p:nvSpPr>
+          <p:cNvPr id="27" name="Rounded Rectangle 26">
             <a:extLst>
               <a:ext uri="{FF2B5EF4-FFF2-40B4-BE49-F238E27FC236}">
-                <a16:creationId xmlns:a16="http://schemas.microsoft.com/office/drawing/2014/main" id="{EE54A6FE-D8CB-48A3-900B-053D4EBD3B85}"/>
-              </a:ext>
-              <a:ext uri="{C183D7F6-B498-43B3-948B-1728B52AA6E4}">
-                <adec:decorative xmlns:adec="http://schemas.microsoft.com/office/drawing/2017/decorative" val="1"/>
+                <a16:creationId xmlns:a16="http://schemas.microsoft.com/office/drawing/2014/main" id="{EF2FE0F7-B4DE-7400-6E33-E68E1E560A9D}"/>
               </a:ext>
             </a:extLst>
           </p:cNvPr>
-          <p:cNvSpPr>
-            <a:spLocks noGrp="1" noRot="1" noChangeAspect="1" noMove="1" noResize="1" noEditPoints="1" noAdjustHandles="1" noChangeArrowheads="1" noChangeShapeType="1" noTextEdit="1"/>
-          </p:cNvSpPr>
-          <p:nvPr>
-            <p:extLst>
-              <p:ext uri="{386F3935-93C4-4BCD-93E2-E3B085C9AB24}">
-                <p16:designElem xmlns:p16="http://schemas.microsoft.com/office/powerpoint/2015/main" val="1"/>
-              </p:ext>
-            </p:extLst>
-          </p:nvPr>
-        </p:nvSpPr>
-        <p:spPr>
-          <a:xfrm>
-            <a:off x="8042147" y="453643"/>
-            <a:ext cx="3703320" cy="98554"/>
-          </a:xfrm>
-          <a:prstGeom prst="rect">
+          <p:cNvSpPr/>
+          <p:nvPr/>
+        </p:nvSpPr>
+        <p:spPr>
+          <a:xfrm>
+            <a:off x="3246784" y="2595196"/>
+            <a:ext cx="1022708" cy="278633"/>
+          </a:xfrm>
+          <a:prstGeom prst="roundRect">
             <a:avLst/>
           </a:prstGeom>
-          <a:solidFill>
-            <a:srgbClr val="969FA7"/>
-          </a:solidFill>
+          <a:noFill/>
           <a:ln>
-            <a:noFill/>
+            <a:solidFill>
+              <a:srgbClr val="FF0000"/>
+            </a:solidFill>
           </a:ln>
-          <a:effectLst/>
         </p:spPr>
         <p:style>
-          <a:lnRef idx="1">
-            <a:schemeClr val="accent1"/>
+          <a:lnRef idx="2">
+            <a:schemeClr val="accent1">
+              <a:shade val="15000"/>
+            </a:schemeClr>
           </a:lnRef>
-          <a:fillRef idx="3">
+          <a:fillRef idx="1">
             <a:schemeClr val="accent1"/>
           </a:fillRef>
-          <a:effectRef idx="2">
+          <a:effectRef idx="0">
             <a:schemeClr val="accent1"/>
           </a:effectRef>
           <a:fontRef idx="minor">
@@ -9441,143 +9884,88 @@
           </a:fontRef>
         </p:style>
         <p:txBody>
-          <a:bodyPr/>
+          <a:bodyPr rtlCol="0" anchor="ctr"/>
           <a:lstStyle/>
           <a:p>
+            <a:pPr algn="ctr"/>
             <a:endParaRPr lang="en-US"/>
           </a:p>
         </p:txBody>
       </p:sp>
-      <p:pic>
-        <p:nvPicPr>
-          <p:cNvPr id="7" name="Content Placeholder 6" descr="A person in a white coat doing a science experiment&#10;&#10;Description automatically generated">
+      <p:sp>
+        <p:nvSpPr>
+          <p:cNvPr id="28" name="TextBox 27">
             <a:extLst>
               <a:ext uri="{FF2B5EF4-FFF2-40B4-BE49-F238E27FC236}">
-                <a16:creationId xmlns:a16="http://schemas.microsoft.com/office/drawing/2014/main" id="{FBD1115A-DF7E-1A62-666F-947B5679B13F}"/>
+                <a16:creationId xmlns:a16="http://schemas.microsoft.com/office/drawing/2014/main" id="{4DB01236-24FF-F59D-1DA2-DCEFDB8D1B99}"/>
               </a:ext>
             </a:extLst>
           </p:cNvPr>
-          <p:cNvPicPr>
-            <a:picLocks noGrp="1" noChangeAspect="1"/>
-          </p:cNvPicPr>
-          <p:nvPr>
-            <p:ph sz="half" idx="2"/>
-          </p:nvPr>
-        </p:nvPicPr>
-        <p:blipFill rotWithShape="1">
-          <a:blip r:embed="rId2">
-            <a:extLst>
-              <a:ext uri="{28A0092B-C50C-407E-A947-70E740481C1C}">
-                <a14:useLocalDpi xmlns:a14="http://schemas.microsoft.com/office/drawing/2010/main" val="0"/>
-              </a:ext>
-            </a:extLst>
-          </a:blip>
-          <a:srcRect l="11254" t="-436" r="24613" b="439"/>
-          <a:stretch/>
-        </p:blipFill>
-        <p:spPr>
-          <a:xfrm>
-            <a:off x="446534" y="601201"/>
-            <a:ext cx="3703320" cy="5774200"/>
+          <p:cNvSpPr txBox="1"/>
+          <p:nvPr/>
+        </p:nvSpPr>
+        <p:spPr>
+          <a:xfrm>
+            <a:off x="3884774" y="5851997"/>
+            <a:ext cx="4457152" cy="523220"/>
           </a:xfrm>
           <a:prstGeom prst="rect">
             <a:avLst/>
           </a:prstGeom>
-        </p:spPr>
-      </p:pic>
-      <p:sp>
-        <p:nvSpPr>
-          <p:cNvPr id="3" name="Content Placeholder 2">
-            <a:extLst>
-              <a:ext uri="{FF2B5EF4-FFF2-40B4-BE49-F238E27FC236}">
-                <a16:creationId xmlns:a16="http://schemas.microsoft.com/office/drawing/2014/main" id="{F6CC5DE2-2678-4F40-A49A-D84BF4E75F4F}"/>
-              </a:ext>
-            </a:extLst>
-          </p:cNvPr>
-          <p:cNvSpPr>
-            <a:spLocks noGrp="1"/>
-          </p:cNvSpPr>
-          <p:nvPr>
-            <p:ph sz="half" idx="1"/>
-          </p:nvPr>
-        </p:nvSpPr>
-        <p:spPr>
-          <a:xfrm>
-            <a:off x="4382726" y="1896533"/>
-            <a:ext cx="7362740" cy="4478868"/>
-          </a:xfrm>
-        </p:spPr>
-        <p:txBody>
-          <a:bodyPr vert="horz" lIns="91440" tIns="45720" rIns="91440" bIns="45720" rtlCol="0" anchor="ctr">
-            <a:normAutofit/>
+          <a:noFill/>
+        </p:spPr>
+        <p:txBody>
+          <a:bodyPr wrap="square" rtlCol="0">
+            <a:spAutoFit/>
           </a:bodyPr>
           <a:lstStyle/>
           <a:p>
-            <a:pPr marL="0" indent="0">
-              <a:buNone/>
-            </a:pPr>
-            <a:r>
-              <a:rPr lang="en-US" sz="1600" dirty="0"/>
-              <a:t>Experiments</a:t>
-            </a:r>
-            <a:r>
-              <a:rPr lang="en-US" sz="1600" baseline="30000" dirty="0"/>
-              <a:t>*</a:t>
-            </a:r>
-            <a:r>
-              <a:rPr lang="en-US" sz="1600" dirty="0"/>
-              <a:t> have a common data structure (we will call it “architecture”).</a:t>
-            </a:r>
-          </a:p>
-          <a:p>
-            <a:pPr marL="0" indent="0">
-              <a:buNone/>
-            </a:pPr>
-            <a:r>
-              <a:rPr lang="en-US" sz="1600" dirty="0"/>
-              <a:t>Recognizing this lets us master common data techniques to analyze efficiently and have data in good formats for graphing</a:t>
-            </a:r>
-          </a:p>
-          <a:p>
-            <a:pPr marL="0" indent="0">
-              <a:buNone/>
-            </a:pPr>
-            <a:r>
-              <a:rPr lang="en-US" sz="1600" u="sng" dirty="0"/>
-              <a:t>Objectives</a:t>
-            </a:r>
-          </a:p>
-          <a:p>
-            <a:r>
-              <a:rPr lang="en-US" sz="1600" dirty="0"/>
-              <a:t>Learn reusable terms for the data elements from experiments</a:t>
-            </a:r>
-          </a:p>
-          <a:p>
-            <a:r>
-              <a:rPr lang="en-US" sz="1600" dirty="0"/>
-              <a:t>Learn how use common software to do needed transformations to go from raw data to analyzed summary</a:t>
-            </a:r>
-          </a:p>
-          <a:p>
-            <a:r>
-              <a:rPr lang="en-US" sz="1600" dirty="0"/>
-              <a:t>Learn how to “curate” experimental data to make it easy to find and share</a:t>
-            </a:r>
-          </a:p>
-          <a:p>
-            <a:pPr marL="0" indent="0">
-              <a:buNone/>
-            </a:pPr>
-            <a:endParaRPr lang="en-US" sz="1600" dirty="0"/>
-          </a:p>
-          <a:p>
-            <a:pPr marL="0" indent="0">
-              <a:buNone/>
-            </a:pPr>
-            <a:r>
-              <a:rPr lang="en-US" sz="1600" dirty="0"/>
-              <a:t>* Data don’t know whether they were generated in a lab or virtual experiment, so this applies to computer modeling data and physical experiments</a:t>
+            <a:r>
+              <a:rPr lang="en-US" sz="1400" dirty="0">
+                <a:solidFill>
+                  <a:srgbClr val="FF0000"/>
+                </a:solidFill>
+              </a:rPr>
+              <a:t>Anaconda selects related (aka “dependent”) packages needed by the selected package</a:t>
+            </a:r>
+          </a:p>
+        </p:txBody>
+      </p:sp>
+      <p:sp>
+        <p:nvSpPr>
+          <p:cNvPr id="29" name="TextBox 28">
+            <a:extLst>
+              <a:ext uri="{FF2B5EF4-FFF2-40B4-BE49-F238E27FC236}">
+                <a16:creationId xmlns:a16="http://schemas.microsoft.com/office/drawing/2014/main" id="{AC4062EC-6534-CB09-A973-7BF4852CDD0F}"/>
+              </a:ext>
+            </a:extLst>
+          </p:cNvPr>
+          <p:cNvSpPr txBox="1"/>
+          <p:nvPr/>
+        </p:nvSpPr>
+        <p:spPr>
+          <a:xfrm>
+            <a:off x="3342528" y="3307209"/>
+            <a:ext cx="4999398" cy="307777"/>
+          </a:xfrm>
+          <a:prstGeom prst="rect">
+            <a:avLst/>
+          </a:prstGeom>
+          <a:noFill/>
+        </p:spPr>
+        <p:txBody>
+          <a:bodyPr wrap="square" rtlCol="0">
+            <a:spAutoFit/>
+          </a:bodyPr>
+          <a:lstStyle/>
+          <a:p>
+            <a:r>
+              <a:rPr lang="en-US" sz="1400" dirty="0">
+                <a:solidFill>
+                  <a:srgbClr val="FF0000"/>
+                </a:solidFill>
+              </a:rPr>
+              <a:t>** regex is not Installed in environment named “Latest” **</a:t>
             </a:r>
           </a:p>
         </p:txBody>
@@ -9585,7 +9973,7 @@
     </p:spTree>
     <p:extLst>
       <p:ext uri="{BB962C8B-B14F-4D97-AF65-F5344CB8AC3E}">
-        <p14:creationId xmlns:p14="http://schemas.microsoft.com/office/powerpoint/2010/main" val="2167497379"/>
+        <p14:creationId xmlns:p14="http://schemas.microsoft.com/office/powerpoint/2010/main" val="3457585315"/>
       </p:ext>
     </p:extLst>
   </p:cSld>
@@ -9620,72 +10008,12 @@
           <a:chExt cx="0" cy="0"/>
         </a:xfrm>
       </p:grpSpPr>
-      <p:sp useBgFill="1">
-        <p:nvSpPr>
-          <p:cNvPr id="10" name="Rectangle 9">
+      <p:sp>
+        <p:nvSpPr>
+          <p:cNvPr id="12" name="Rectangle 11">
             <a:extLst>
               <a:ext uri="{FF2B5EF4-FFF2-40B4-BE49-F238E27FC236}">
-                <a16:creationId xmlns:a16="http://schemas.microsoft.com/office/drawing/2014/main" id="{F875149D-F692-45DA-8324-D5E0193D5FC4}"/>
-              </a:ext>
-              <a:ext uri="{C183D7F6-B498-43B3-948B-1728B52AA6E4}">
-                <adec:decorative xmlns:adec="http://schemas.microsoft.com/office/drawing/2017/decorative" val="1"/>
-              </a:ext>
-            </a:extLst>
-          </p:cNvPr>
-          <p:cNvSpPr>
-            <a:spLocks noGrp="1" noRot="1" noChangeAspect="1" noMove="1" noResize="1" noEditPoints="1" noAdjustHandles="1" noChangeArrowheads="1" noChangeShapeType="1" noTextEdit="1"/>
-          </p:cNvSpPr>
-          <p:nvPr>
-            <p:extLst>
-              <p:ext uri="{386F3935-93C4-4BCD-93E2-E3B085C9AB24}">
-                <p16:designElem xmlns:p16="http://schemas.microsoft.com/office/powerpoint/2015/main" val="1"/>
-              </p:ext>
-            </p:extLst>
-          </p:nvPr>
-        </p:nvSpPr>
-        <p:spPr>
-          <a:xfrm>
-            <a:off x="0" y="0"/>
-            <a:ext cx="12191999" cy="6858001"/>
-          </a:xfrm>
-          <a:prstGeom prst="rect">
-            <a:avLst/>
-          </a:prstGeom>
-          <a:ln>
-            <a:noFill/>
-          </a:ln>
-        </p:spPr>
-        <p:style>
-          <a:lnRef idx="2">
-            <a:schemeClr val="accent1">
-              <a:shade val="50000"/>
-            </a:schemeClr>
-          </a:lnRef>
-          <a:fillRef idx="1">
-            <a:schemeClr val="accent1"/>
-          </a:fillRef>
-          <a:effectRef idx="0">
-            <a:schemeClr val="accent1"/>
-          </a:effectRef>
-          <a:fontRef idx="minor">
-            <a:schemeClr val="lt1"/>
-          </a:fontRef>
-        </p:style>
-        <p:txBody>
-          <a:bodyPr rtlCol="0" anchor="ctr"/>
-          <a:lstStyle/>
-          <a:p>
-            <a:pPr algn="ctr"/>
-            <a:endParaRPr lang="en-US"/>
-          </a:p>
-        </p:txBody>
-      </p:sp>
-      <p:sp>
-        <p:nvSpPr>
-          <p:cNvPr id="12" name="Rectangle 11">
-            <a:extLst>
-              <a:ext uri="{FF2B5EF4-FFF2-40B4-BE49-F238E27FC236}">
-                <a16:creationId xmlns:a16="http://schemas.microsoft.com/office/drawing/2014/main" id="{C0B19935-C760-4698-9DD1-973C8A428D26}"/>
+                <a16:creationId xmlns:a16="http://schemas.microsoft.com/office/drawing/2014/main" id="{E6C8E6EB-4C59-429B-97E4-72A058CFC4FB}"/>
               </a:ext>
               <a:ext uri="{C183D7F6-B498-43B3-948B-1728B52AA6E4}">
                 <adec:decorative xmlns:adec="http://schemas.microsoft.com/office/drawing/2017/decorative" val="1"/>
@@ -9746,68 +10074,7 @@
           <p:cNvPr id="14" name="Rectangle 13">
             <a:extLst>
               <a:ext uri="{FF2B5EF4-FFF2-40B4-BE49-F238E27FC236}">
-                <a16:creationId xmlns:a16="http://schemas.microsoft.com/office/drawing/2014/main" id="{08990612-E008-4F02-AEBB-B140BE753558}"/>
-              </a:ext>
-              <a:ext uri="{C183D7F6-B498-43B3-948B-1728B52AA6E4}">
-                <adec:decorative xmlns:adec="http://schemas.microsoft.com/office/drawing/2017/decorative" val="1"/>
-              </a:ext>
-            </a:extLst>
-          </p:cNvPr>
-          <p:cNvSpPr>
-            <a:spLocks noGrp="1" noRot="1" noChangeAspect="1" noMove="1" noResize="1" noEditPoints="1" noAdjustHandles="1" noChangeArrowheads="1" noChangeShapeType="1" noTextEdit="1"/>
-          </p:cNvSpPr>
-          <p:nvPr>
-            <p:extLst>
-              <p:ext uri="{386F3935-93C4-4BCD-93E2-E3B085C9AB24}">
-                <p16:designElem xmlns:p16="http://schemas.microsoft.com/office/powerpoint/2015/main" val="1"/>
-              </p:ext>
-            </p:extLst>
-          </p:nvPr>
-        </p:nvSpPr>
-        <p:spPr>
-          <a:xfrm>
-            <a:off x="4241830" y="457200"/>
-            <a:ext cx="3703320" cy="91440"/>
-          </a:xfrm>
-          <a:prstGeom prst="rect">
-            <a:avLst/>
-          </a:prstGeom>
-          <a:solidFill>
-            <a:schemeClr val="accent1"/>
-          </a:solidFill>
-          <a:ln>
-            <a:noFill/>
-          </a:ln>
-          <a:effectLst/>
-        </p:spPr>
-        <p:style>
-          <a:lnRef idx="1">
-            <a:schemeClr val="accent1"/>
-          </a:lnRef>
-          <a:fillRef idx="3">
-            <a:schemeClr val="accent1"/>
-          </a:fillRef>
-          <a:effectRef idx="2">
-            <a:schemeClr val="accent1"/>
-          </a:effectRef>
-          <a:fontRef idx="minor">
-            <a:schemeClr val="lt1"/>
-          </a:fontRef>
-        </p:style>
-        <p:txBody>
-          <a:bodyPr/>
-          <a:lstStyle/>
-          <a:p>
-            <a:endParaRPr lang="en-US"/>
-          </a:p>
-        </p:txBody>
-      </p:sp>
-      <p:sp>
-        <p:nvSpPr>
-          <p:cNvPr id="16" name="Rectangle 15">
-            <a:extLst>
-              <a:ext uri="{FF2B5EF4-FFF2-40B4-BE49-F238E27FC236}">
-                <a16:creationId xmlns:a16="http://schemas.microsoft.com/office/drawing/2014/main" id="{A310A41F-3A14-4150-B6CF-0A577DDDEAD2}"/>
+                <a16:creationId xmlns:a16="http://schemas.microsoft.com/office/drawing/2014/main" id="{B5B90362-AFCC-46A9-B41C-A257A8C5B314}"/>
               </a:ext>
               <a:ext uri="{C183D7F6-B498-43B3-948B-1728B52AA6E4}">
                 <adec:decorative xmlns:adec="http://schemas.microsoft.com/office/drawing/2017/decorative" val="1"/>
@@ -9865,10 +10132,10 @@
       </p:sp>
       <p:sp>
         <p:nvSpPr>
-          <p:cNvPr id="18" name="Rectangle 17">
+          <p:cNvPr id="16" name="Rectangle 15">
             <a:extLst>
               <a:ext uri="{FF2B5EF4-FFF2-40B4-BE49-F238E27FC236}">
-                <a16:creationId xmlns:a16="http://schemas.microsoft.com/office/drawing/2014/main" id="{7B89EEFD-93BC-4ACF-962C-E6279E72B00B}"/>
+                <a16:creationId xmlns:a16="http://schemas.microsoft.com/office/drawing/2014/main" id="{F71EF7F1-38BA-471D-8CD4-2A9AE8E35527}"/>
               </a:ext>
               <a:ext uri="{C183D7F6-B498-43B3-948B-1728B52AA6E4}">
                 <adec:decorative xmlns:adec="http://schemas.microsoft.com/office/drawing/2017/decorative" val="1"/>
@@ -9888,8 +10155,171 @@
         </p:nvSpPr>
         <p:spPr>
           <a:xfrm>
-            <a:off x="461436" y="723899"/>
-            <a:ext cx="3703320" cy="5666666"/>
+            <a:off x="4241830" y="457200"/>
+            <a:ext cx="3703320" cy="91440"/>
+          </a:xfrm>
+          <a:prstGeom prst="rect">
+            <a:avLst/>
+          </a:prstGeom>
+          <a:solidFill>
+            <a:schemeClr val="accent1"/>
+          </a:solidFill>
+          <a:ln>
+            <a:noFill/>
+          </a:ln>
+          <a:effectLst/>
+        </p:spPr>
+        <p:style>
+          <a:lnRef idx="1">
+            <a:schemeClr val="accent1"/>
+          </a:lnRef>
+          <a:fillRef idx="3">
+            <a:schemeClr val="accent1"/>
+          </a:fillRef>
+          <a:effectRef idx="2">
+            <a:schemeClr val="accent1"/>
+          </a:effectRef>
+          <a:fontRef idx="minor">
+            <a:schemeClr val="lt1"/>
+          </a:fontRef>
+        </p:style>
+        <p:txBody>
+          <a:bodyPr/>
+          <a:lstStyle/>
+          <a:p>
+            <a:endParaRPr lang="en-US"/>
+          </a:p>
+        </p:txBody>
+      </p:sp>
+      <p:sp useBgFill="1">
+        <p:nvSpPr>
+          <p:cNvPr id="18" name="Rectangle 17">
+            <a:extLst>
+              <a:ext uri="{FF2B5EF4-FFF2-40B4-BE49-F238E27FC236}">
+                <a16:creationId xmlns:a16="http://schemas.microsoft.com/office/drawing/2014/main" id="{1BB56EB9-078F-4952-AC1F-149C7A0AE4D5}"/>
+              </a:ext>
+              <a:ext uri="{C183D7F6-B498-43B3-948B-1728B52AA6E4}">
+                <adec:decorative xmlns:adec="http://schemas.microsoft.com/office/drawing/2017/decorative" val="1"/>
+              </a:ext>
+            </a:extLst>
+          </p:cNvPr>
+          <p:cNvSpPr>
+            <a:spLocks noGrp="1" noRot="1" noChangeAspect="1" noMove="1" noResize="1" noEditPoints="1" noAdjustHandles="1" noChangeArrowheads="1" noChangeShapeType="1" noTextEdit="1"/>
+          </p:cNvSpPr>
+          <p:nvPr>
+            <p:extLst>
+              <p:ext uri="{386F3935-93C4-4BCD-93E2-E3B085C9AB24}">
+                <p16:designElem xmlns:p16="http://schemas.microsoft.com/office/powerpoint/2015/main" val="1"/>
+              </p:ext>
+            </p:extLst>
+          </p:nvPr>
+        </p:nvSpPr>
+        <p:spPr>
+          <a:xfrm>
+            <a:off x="0" y="0"/>
+            <a:ext cx="12192000" cy="6858000"/>
+          </a:xfrm>
+          <a:prstGeom prst="rect">
+            <a:avLst/>
+          </a:prstGeom>
+          <a:ln>
+            <a:noFill/>
+          </a:ln>
+        </p:spPr>
+        <p:style>
+          <a:lnRef idx="2">
+            <a:schemeClr val="accent1">
+              <a:shade val="50000"/>
+            </a:schemeClr>
+          </a:lnRef>
+          <a:fillRef idx="1">
+            <a:schemeClr val="accent1"/>
+          </a:fillRef>
+          <a:effectRef idx="0">
+            <a:schemeClr val="accent1"/>
+          </a:effectRef>
+          <a:fontRef idx="minor">
+            <a:schemeClr val="lt1"/>
+          </a:fontRef>
+        </p:style>
+        <p:txBody>
+          <a:bodyPr rtlCol="0" anchor="ctr"/>
+          <a:lstStyle/>
+          <a:p>
+            <a:pPr algn="ctr"/>
+            <a:endParaRPr lang="en-US"/>
+          </a:p>
+        </p:txBody>
+      </p:sp>
+      <p:sp>
+        <p:nvSpPr>
+          <p:cNvPr id="2" name="Title 1">
+            <a:extLst>
+              <a:ext uri="{FF2B5EF4-FFF2-40B4-BE49-F238E27FC236}">
+                <a16:creationId xmlns:a16="http://schemas.microsoft.com/office/drawing/2014/main" id="{54EE378A-F88D-4129-A984-BE9F8C7B2BC5}"/>
+              </a:ext>
+            </a:extLst>
+          </p:cNvPr>
+          <p:cNvSpPr>
+            <a:spLocks noGrp="1"/>
+          </p:cNvSpPr>
+          <p:nvPr>
+            <p:ph type="title"/>
+          </p:nvPr>
+        </p:nvSpPr>
+        <p:spPr>
+          <a:xfrm>
+            <a:off x="4382724" y="702156"/>
+            <a:ext cx="7225075" cy="1013800"/>
+          </a:xfrm>
+        </p:spPr>
+        <p:txBody>
+          <a:bodyPr vert="horz" lIns="91440" tIns="45720" rIns="91440" bIns="45720" rtlCol="0" anchor="b">
+            <a:normAutofit/>
+          </a:bodyPr>
+          <a:lstStyle/>
+          <a:p>
+            <a:r>
+              <a:rPr lang="en-US" b="0" kern="1200" cap="all" dirty="0">
+                <a:solidFill>
+                  <a:schemeClr val="tx2"/>
+                </a:solidFill>
+                <a:latin typeface="+mj-lt"/>
+                <a:ea typeface="+mj-ea"/>
+                <a:cs typeface="+mj-cs"/>
+              </a:rPr>
+              <a:t>Objectives</a:t>
+            </a:r>
+          </a:p>
+        </p:txBody>
+      </p:sp>
+      <p:sp>
+        <p:nvSpPr>
+          <p:cNvPr id="20" name="Rectangle 19">
+            <a:extLst>
+              <a:ext uri="{FF2B5EF4-FFF2-40B4-BE49-F238E27FC236}">
+                <a16:creationId xmlns:a16="http://schemas.microsoft.com/office/drawing/2014/main" id="{10058680-D07C-4893-B2B7-91543F18AB32}"/>
+              </a:ext>
+              <a:ext uri="{C183D7F6-B498-43B3-948B-1728B52AA6E4}">
+                <adec:decorative xmlns:adec="http://schemas.microsoft.com/office/drawing/2017/decorative" val="1"/>
+              </a:ext>
+            </a:extLst>
+          </p:cNvPr>
+          <p:cNvSpPr>
+            <a:spLocks noGrp="1" noRot="1" noChangeAspect="1" noMove="1" noResize="1" noEditPoints="1" noAdjustHandles="1" noChangeArrowheads="1" noChangeShapeType="1" noTextEdit="1"/>
+          </p:cNvSpPr>
+          <p:nvPr>
+            <p:extLst>
+              <p:ext uri="{386F3935-93C4-4BCD-93E2-E3B085C9AB24}">
+                <p16:designElem xmlns:p16="http://schemas.microsoft.com/office/powerpoint/2015/main" val="1"/>
+              </p:ext>
+            </p:extLst>
+          </p:nvPr>
+        </p:nvSpPr>
+        <p:spPr>
+          <a:xfrm>
+            <a:off x="446534" y="472603"/>
+            <a:ext cx="3703320" cy="94997"/>
           </a:xfrm>
           <a:prstGeom prst="rect">
             <a:avLst/>
@@ -9926,224 +10356,256 @@
       </p:sp>
       <p:sp>
         <p:nvSpPr>
-          <p:cNvPr id="2" name="Title 1">
+          <p:cNvPr id="22" name="Rectangle 21">
             <a:extLst>
               <a:ext uri="{FF2B5EF4-FFF2-40B4-BE49-F238E27FC236}">
-                <a16:creationId xmlns:a16="http://schemas.microsoft.com/office/drawing/2014/main" id="{54EE378A-F88D-4129-A984-BE9F8C7B2BC5}"/>
+                <a16:creationId xmlns:a16="http://schemas.microsoft.com/office/drawing/2014/main" id="{7B42427A-0A1F-4A55-8705-D9179F1E0CFB}"/>
+              </a:ext>
+              <a:ext uri="{C183D7F6-B498-43B3-948B-1728B52AA6E4}">
+                <adec:decorative xmlns:adec="http://schemas.microsoft.com/office/drawing/2017/decorative" val="1"/>
               </a:ext>
             </a:extLst>
           </p:cNvPr>
           <p:cNvSpPr>
+            <a:spLocks noGrp="1" noRot="1" noChangeAspect="1" noMove="1" noResize="1" noEditPoints="1" noAdjustHandles="1" noChangeArrowheads="1" noChangeShapeType="1" noTextEdit="1"/>
+          </p:cNvSpPr>
+          <p:nvPr>
+            <p:extLst>
+              <p:ext uri="{386F3935-93C4-4BCD-93E2-E3B085C9AB24}">
+                <p16:designElem xmlns:p16="http://schemas.microsoft.com/office/powerpoint/2015/main" val="1"/>
+              </p:ext>
+            </p:extLst>
+          </p:nvPr>
+        </p:nvSpPr>
+        <p:spPr>
+          <a:xfrm>
+            <a:off x="4241830" y="457200"/>
+            <a:ext cx="3703320" cy="91440"/>
+          </a:xfrm>
+          <a:prstGeom prst="rect">
+            <a:avLst/>
+          </a:prstGeom>
+          <a:solidFill>
+            <a:schemeClr val="accent1"/>
+          </a:solidFill>
+          <a:ln>
+            <a:noFill/>
+          </a:ln>
+          <a:effectLst/>
+        </p:spPr>
+        <p:style>
+          <a:lnRef idx="1">
+            <a:schemeClr val="accent1"/>
+          </a:lnRef>
+          <a:fillRef idx="3">
+            <a:schemeClr val="accent1"/>
+          </a:fillRef>
+          <a:effectRef idx="2">
+            <a:schemeClr val="accent1"/>
+          </a:effectRef>
+          <a:fontRef idx="minor">
+            <a:schemeClr val="lt1"/>
+          </a:fontRef>
+        </p:style>
+        <p:txBody>
+          <a:bodyPr/>
+          <a:lstStyle/>
+          <a:p>
+            <a:endParaRPr lang="en-US" dirty="0"/>
+          </a:p>
+        </p:txBody>
+      </p:sp>
+      <p:sp>
+        <p:nvSpPr>
+          <p:cNvPr id="24" name="Rectangle 23">
+            <a:extLst>
+              <a:ext uri="{FF2B5EF4-FFF2-40B4-BE49-F238E27FC236}">
+                <a16:creationId xmlns:a16="http://schemas.microsoft.com/office/drawing/2014/main" id="{EE54A6FE-D8CB-48A3-900B-053D4EBD3B85}"/>
+              </a:ext>
+              <a:ext uri="{C183D7F6-B498-43B3-948B-1728B52AA6E4}">
+                <adec:decorative xmlns:adec="http://schemas.microsoft.com/office/drawing/2017/decorative" val="1"/>
+              </a:ext>
+            </a:extLst>
+          </p:cNvPr>
+          <p:cNvSpPr>
+            <a:spLocks noGrp="1" noRot="1" noChangeAspect="1" noMove="1" noResize="1" noEditPoints="1" noAdjustHandles="1" noChangeArrowheads="1" noChangeShapeType="1" noTextEdit="1"/>
+          </p:cNvSpPr>
+          <p:nvPr>
+            <p:extLst>
+              <p:ext uri="{386F3935-93C4-4BCD-93E2-E3B085C9AB24}">
+                <p16:designElem xmlns:p16="http://schemas.microsoft.com/office/powerpoint/2015/main" val="1"/>
+              </p:ext>
+            </p:extLst>
+          </p:nvPr>
+        </p:nvSpPr>
+        <p:spPr>
+          <a:xfrm>
+            <a:off x="8042147" y="453643"/>
+            <a:ext cx="3703320" cy="98554"/>
+          </a:xfrm>
+          <a:prstGeom prst="rect">
+            <a:avLst/>
+          </a:prstGeom>
+          <a:solidFill>
+            <a:srgbClr val="969FA7"/>
+          </a:solidFill>
+          <a:ln>
+            <a:noFill/>
+          </a:ln>
+          <a:effectLst/>
+        </p:spPr>
+        <p:style>
+          <a:lnRef idx="1">
+            <a:schemeClr val="accent1"/>
+          </a:lnRef>
+          <a:fillRef idx="3">
+            <a:schemeClr val="accent1"/>
+          </a:fillRef>
+          <a:effectRef idx="2">
+            <a:schemeClr val="accent1"/>
+          </a:effectRef>
+          <a:fontRef idx="minor">
+            <a:schemeClr val="lt1"/>
+          </a:fontRef>
+        </p:style>
+        <p:txBody>
+          <a:bodyPr/>
+          <a:lstStyle/>
+          <a:p>
+            <a:endParaRPr lang="en-US"/>
+          </a:p>
+        </p:txBody>
+      </p:sp>
+      <p:pic>
+        <p:nvPicPr>
+          <p:cNvPr id="7" name="Content Placeholder 6" descr="A person in a white coat doing a science experiment&#10;&#10;Description automatically generated">
+            <a:extLst>
+              <a:ext uri="{FF2B5EF4-FFF2-40B4-BE49-F238E27FC236}">
+                <a16:creationId xmlns:a16="http://schemas.microsoft.com/office/drawing/2014/main" id="{FBD1115A-DF7E-1A62-666F-947B5679B13F}"/>
+              </a:ext>
+            </a:extLst>
+          </p:cNvPr>
+          <p:cNvPicPr>
+            <a:picLocks noGrp="1" noChangeAspect="1"/>
+          </p:cNvPicPr>
+          <p:nvPr>
+            <p:ph sz="half" idx="2"/>
+          </p:nvPr>
+        </p:nvPicPr>
+        <p:blipFill rotWithShape="1">
+          <a:blip r:embed="rId2">
+            <a:extLst>
+              <a:ext uri="{28A0092B-C50C-407E-A947-70E740481C1C}">
+                <a14:useLocalDpi xmlns:a14="http://schemas.microsoft.com/office/drawing/2010/main" val="0"/>
+              </a:ext>
+            </a:extLst>
+          </a:blip>
+          <a:srcRect l="11254" t="-436" r="24613" b="439"/>
+          <a:stretch/>
+        </p:blipFill>
+        <p:spPr>
+          <a:xfrm>
+            <a:off x="446534" y="601201"/>
+            <a:ext cx="3703320" cy="5774200"/>
+          </a:xfrm>
+          <a:prstGeom prst="rect">
+            <a:avLst/>
+          </a:prstGeom>
+        </p:spPr>
+      </p:pic>
+      <p:sp>
+        <p:nvSpPr>
+          <p:cNvPr id="3" name="Content Placeholder 2">
+            <a:extLst>
+              <a:ext uri="{FF2B5EF4-FFF2-40B4-BE49-F238E27FC236}">
+                <a16:creationId xmlns:a16="http://schemas.microsoft.com/office/drawing/2014/main" id="{F6CC5DE2-2678-4F40-A49A-D84BF4E75F4F}"/>
+              </a:ext>
+            </a:extLst>
+          </p:cNvPr>
+          <p:cNvSpPr>
             <a:spLocks noGrp="1"/>
           </p:cNvSpPr>
           <p:nvPr>
-            <p:ph type="title"/>
-          </p:nvPr>
-        </p:nvSpPr>
-        <p:spPr>
-          <a:xfrm>
-            <a:off x="803189" y="1209184"/>
-            <a:ext cx="3089189" cy="4734416"/>
-          </a:xfrm>
-        </p:spPr>
-        <p:txBody>
-          <a:bodyPr anchor="ctr">
+            <p:ph sz="half" idx="1"/>
+          </p:nvPr>
+        </p:nvSpPr>
+        <p:spPr>
+          <a:xfrm>
+            <a:off x="4382726" y="1896533"/>
+            <a:ext cx="7362740" cy="4478868"/>
+          </a:xfrm>
+        </p:spPr>
+        <p:txBody>
+          <a:bodyPr vert="horz" lIns="91440" tIns="45720" rIns="91440" bIns="45720" rtlCol="0" anchor="ctr">
             <a:normAutofit/>
           </a:bodyPr>
           <a:lstStyle/>
           <a:p>
-            <a:r>
-              <a:rPr lang="en-US" dirty="0">
-                <a:solidFill>
-                  <a:srgbClr val="FFFFFF"/>
-                </a:solidFill>
-              </a:rPr>
-              <a:t>What are Experiments?</a:t>
-            </a:r>
-          </a:p>
-        </p:txBody>
-      </p:sp>
-      <p:sp>
-        <p:nvSpPr>
-          <p:cNvPr id="3" name="Content Placeholder 2">
-            <a:extLst>
-              <a:ext uri="{FF2B5EF4-FFF2-40B4-BE49-F238E27FC236}">
-                <a16:creationId xmlns:a16="http://schemas.microsoft.com/office/drawing/2014/main" id="{F6CC5DE2-2678-4F40-A49A-D84BF4E75F4F}"/>
-              </a:ext>
-            </a:extLst>
-          </p:cNvPr>
-          <p:cNvSpPr>
-            <a:spLocks noGrp="1"/>
-          </p:cNvSpPr>
-          <p:nvPr>
-            <p:ph idx="1"/>
-          </p:nvPr>
-        </p:nvSpPr>
-        <p:spPr>
-          <a:xfrm>
-            <a:off x="4561870" y="723899"/>
-            <a:ext cx="7183597" cy="5128261"/>
-          </a:xfrm>
-        </p:spPr>
-        <p:txBody>
-          <a:bodyPr>
-            <a:normAutofit/>
-          </a:bodyPr>
-          <a:lstStyle/>
-          <a:p>
             <a:pPr marL="0" indent="0">
-              <a:lnSpc>
-                <a:spcPct val="90000"/>
-              </a:lnSpc>
               <a:buNone/>
             </a:pPr>
             <a:r>
-              <a:rPr lang="en-US" sz="1500" u="sng" dirty="0"/>
-              <a:t>Experiments Cover An amazing range for engineers and scientists!</a:t>
+              <a:rPr lang="en-US" sz="1600" dirty="0"/>
+              <a:t>Experiments</a:t>
+            </a:r>
+            <a:r>
+              <a:rPr lang="en-US" sz="1600" baseline="30000" dirty="0"/>
+              <a:t>*</a:t>
+            </a:r>
+            <a:r>
+              <a:rPr lang="en-US" sz="1600" dirty="0"/>
+              <a:t> have a common data structure (we will call it “architecture”).</a:t>
             </a:r>
           </a:p>
           <a:p>
             <a:pPr marL="0" indent="0">
-              <a:lnSpc>
-                <a:spcPct val="90000"/>
-              </a:lnSpc>
               <a:buNone/>
             </a:pPr>
             <a:r>
-              <a:rPr lang="en-US" sz="1500" dirty="0"/>
-              <a:t>Make a production or lab-scale batch of several product formulations</a:t>
+              <a:rPr lang="en-US" sz="1600" dirty="0"/>
+              <a:t>Recognizing this lets us master common data techniques to analyze efficiently and have data in good formats for graphing</a:t>
             </a:r>
           </a:p>
           <a:p>
             <a:pPr marL="0" indent="0">
-              <a:lnSpc>
-                <a:spcPct val="90000"/>
-              </a:lnSpc>
               <a:buNone/>
             </a:pPr>
             <a:r>
-              <a:rPr lang="en-US" sz="1500" dirty="0"/>
-              <a:t>Run a packing line using pre-set conditions for a set amount of time</a:t>
+              <a:rPr lang="en-US" sz="1600" u="sng" dirty="0"/>
+              <a:t>Objectives</a:t>
+            </a:r>
+          </a:p>
+          <a:p>
+            <a:r>
+              <a:rPr lang="en-US" sz="1600" dirty="0"/>
+              <a:t>Learn reusable terms for the data elements from experiments</a:t>
+            </a:r>
+          </a:p>
+          <a:p>
+            <a:r>
+              <a:rPr lang="en-US" sz="1600" dirty="0"/>
+              <a:t>Learn how use common software to do needed transformations to go from raw data to analyzed summary</a:t>
+            </a:r>
+          </a:p>
+          <a:p>
+            <a:r>
+              <a:rPr lang="en-US" sz="1600" dirty="0"/>
+              <a:t>Learn how to “curate” experimental data to make it easy to find and share</a:t>
             </a:r>
           </a:p>
           <a:p>
             <a:pPr marL="0" indent="0">
-              <a:lnSpc>
-                <a:spcPct val="90000"/>
-              </a:lnSpc>
               <a:buNone/>
             </a:pPr>
-            <a:r>
-              <a:rPr lang="en-US" sz="1500" dirty="0"/>
-              <a:t>Crash a sensor-equipped car into a wall</a:t>
-            </a:r>
+            <a:endParaRPr lang="en-US" sz="1600" dirty="0"/>
           </a:p>
           <a:p>
             <a:pPr marL="0" indent="0">
-              <a:lnSpc>
-                <a:spcPct val="90000"/>
-              </a:lnSpc>
               <a:buNone/>
             </a:pPr>
             <a:r>
-              <a:rPr lang="en-US" sz="1500" dirty="0"/>
-              <a:t>Diaper a baby with several product designs</a:t>
-            </a:r>
-          </a:p>
-          <a:p>
-            <a:pPr marL="0" indent="0">
-              <a:lnSpc>
-                <a:spcPct val="90000"/>
-              </a:lnSpc>
-              <a:buNone/>
-            </a:pPr>
-            <a:r>
-              <a:rPr lang="en-US" sz="1500" dirty="0"/>
-              <a:t>Drive a F1 car around a track with several various fuel mixtures</a:t>
-            </a:r>
-          </a:p>
-          <a:p>
-            <a:pPr marL="0" indent="0">
-              <a:lnSpc>
-                <a:spcPct val="90000"/>
-              </a:lnSpc>
-              <a:buNone/>
-            </a:pPr>
-            <a:r>
-              <a:rPr lang="en-US" sz="1500" dirty="0"/>
-              <a:t>Ask a man to shave his face with 3 different types of razors on consecutive days</a:t>
-            </a:r>
-          </a:p>
-          <a:p>
-            <a:pPr marL="0" indent="0">
-              <a:lnSpc>
-                <a:spcPct val="90000"/>
-              </a:lnSpc>
-              <a:buNone/>
-            </a:pPr>
-            <a:r>
-              <a:rPr lang="en-US" sz="1500" dirty="0"/>
-              <a:t>Make batches of cookies with different types of chocolate</a:t>
-            </a:r>
-          </a:p>
-          <a:p>
-            <a:pPr marL="0" indent="0">
-              <a:lnSpc>
-                <a:spcPct val="90000"/>
-              </a:lnSpc>
-              <a:buNone/>
-            </a:pPr>
-            <a:r>
-              <a:rPr lang="en-US" sz="1500" dirty="0"/>
-              <a:t>Wash test, fabric swatches with different detergent formulations</a:t>
-            </a:r>
-          </a:p>
-          <a:p>
-            <a:pPr marL="0" indent="0">
-              <a:lnSpc>
-                <a:spcPct val="90000"/>
-              </a:lnSpc>
-              <a:buNone/>
-            </a:pPr>
-            <a:r>
-              <a:rPr lang="en-US" sz="1500" dirty="0"/>
-              <a:t>Use different catalysts to run a chemical conversion with the same starting materials</a:t>
-            </a:r>
-          </a:p>
-          <a:p>
-            <a:pPr marL="0" indent="0">
-              <a:lnSpc>
-                <a:spcPct val="90000"/>
-              </a:lnSpc>
-              <a:buNone/>
-            </a:pPr>
-            <a:r>
-              <a:rPr lang="en-US" sz="1500" dirty="0"/>
-              <a:t>Use PCR to replicate and sequence the DNA from multiple virus samples</a:t>
-            </a:r>
-          </a:p>
-          <a:p>
-            <a:pPr marL="0" indent="0">
-              <a:lnSpc>
-                <a:spcPct val="90000"/>
-              </a:lnSpc>
-              <a:buNone/>
-            </a:pPr>
-            <a:r>
-              <a:rPr lang="en-US" sz="1500" dirty="0"/>
-              <a:t>Mop floors with mops using different cleaning solutions</a:t>
-            </a:r>
-          </a:p>
-          <a:p>
-            <a:pPr marL="0" indent="0">
-              <a:lnSpc>
-                <a:spcPct val="90000"/>
-              </a:lnSpc>
-              <a:buNone/>
-            </a:pPr>
-            <a:r>
-              <a:rPr lang="en-US" sz="1500" dirty="0"/>
-              <a:t>Surgically implant artificial joints using different polymeric coatings</a:t>
+              <a:rPr lang="en-US" sz="1600" dirty="0"/>
+              <a:t>* Data don’t know whether they were generated in a lab or virtual experiment, so this applies to computer modeling data and physical experiments</a:t>
             </a:r>
           </a:p>
         </p:txBody>
@@ -10151,7 +10613,7 @@
     </p:spTree>
     <p:extLst>
       <p:ext uri="{BB962C8B-B14F-4D97-AF65-F5344CB8AC3E}">
-        <p14:creationId xmlns:p14="http://schemas.microsoft.com/office/powerpoint/2010/main" val="1437473056"/>
+        <p14:creationId xmlns:p14="http://schemas.microsoft.com/office/powerpoint/2010/main" val="2167497379"/>
       </p:ext>
     </p:extLst>
   </p:cSld>

</xml_diff>